<commit_message>
Changes have been made on the figure to stop different parts from flying in
</commit_message>
<xml_diff>
--- a/IntroToGitHub&SmartGit-v4.1.pptx
+++ b/IntroToGitHub&SmartGit-v4.1.pptx
@@ -1,6 +1,6 @@
 
 <file path=ppt/presentation.xml><?xml version="1.0" encoding="utf-8"?>
-<p:presentation xmlns:a="http://schemas.openxmlformats.org/drawingml/2006/main" xmlns:r="http://schemas.openxmlformats.org/officeDocument/2006/relationships" xmlns:mc="http://schemas.openxmlformats.org/markup-compatibility/2006" xmlns:mv="urn:schemas-microsoft-com:mac:vml" xmlns:p="http://schemas.openxmlformats.org/presentationml/2006/main" mc:Ignorable="mv" mc:PreserveAttributes="mv:*">
+<p:presentation xmlns:a="http://schemas.openxmlformats.org/drawingml/2006/main" xmlns:r="http://schemas.openxmlformats.org/officeDocument/2006/relationships" xmlns:p="http://schemas.openxmlformats.org/presentationml/2006/main">
   <p:sldMasterIdLst>
     <p:sldMasterId id="2147483713" r:id="rId1"/>
   </p:sldMasterIdLst>
@@ -131,14 +131,25 @@
   </p:defaultTextStyle>
   <p:extLst>
     <p:ext uri="{EFAFB233-063F-42B5-8137-9DF3F51BA10A}">
-      <p15:sldGuideLst xmlns="" xmlns:a="http://schemas.openxmlformats.org/drawingml/2006/main" xmlns:r="http://schemas.openxmlformats.org/officeDocument/2006/relationships" xmlns:p="http://schemas.openxmlformats.org/presentationml/2006/main" xmlns:p15="http://schemas.microsoft.com/office/powerpoint/2012/main" xmlns:mv="urn:schemas-microsoft-com:mac:vml" xmlns:mc="http://schemas.openxmlformats.org/markup-compatibility/2006"/>
+      <p15:sldGuideLst xmlns:p15="http://schemas.microsoft.com/office/powerpoint/2012/main">
+        <p15:guide id="1" orient="horz" pos="2160">
+          <p15:clr>
+            <a:srgbClr val="A4A3A4"/>
+          </p15:clr>
+        </p15:guide>
+        <p15:guide id="2" pos="3840">
+          <p15:clr>
+            <a:srgbClr val="A4A3A4"/>
+          </p15:clr>
+        </p15:guide>
+      </p15:sldGuideLst>
     </p:ext>
   </p:extLst>
 </p:presentation>
 </file>
 
 <file path=ppt/notesMasters/notesMaster1.xml><?xml version="1.0" encoding="utf-8"?>
-<p:notesMaster xmlns:a="http://schemas.openxmlformats.org/drawingml/2006/main" xmlns:r="http://schemas.openxmlformats.org/officeDocument/2006/relationships" xmlns:mc="http://schemas.openxmlformats.org/markup-compatibility/2006" xmlns:mv="urn:schemas-microsoft-com:mac:vml" xmlns:p="http://schemas.openxmlformats.org/presentationml/2006/main" mc:Ignorable="mv" mc:PreserveAttributes="mv:*">
+<p:notesMaster xmlns:a="http://schemas.openxmlformats.org/drawingml/2006/main" xmlns:r="http://schemas.openxmlformats.org/officeDocument/2006/relationships" xmlns:p="http://schemas.openxmlformats.org/presentationml/2006/main">
   <p:cSld>
     <p:bg>
       <p:bgRef idx="1001">
@@ -330,7 +341,7 @@
     </p:spTree>
     <p:extLst>
       <p:ext uri="{BB962C8B-B14F-4D97-AF65-F5344CB8AC3E}">
-        <p14:creationId xmlns="" xmlns:a="http://schemas.openxmlformats.org/drawingml/2006/main" xmlns:r="http://schemas.openxmlformats.org/officeDocument/2006/relationships" xmlns:p="http://schemas.openxmlformats.org/presentationml/2006/main" xmlns:p14="http://schemas.microsoft.com/office/powerpoint/2010/main" xmlns:mv="urn:schemas-microsoft-com:mac:vml" xmlns:mc="http://schemas.openxmlformats.org/markup-compatibility/2006" val="241429818"/>
+        <p14:creationId xmlns:p14="http://schemas.microsoft.com/office/powerpoint/2010/main" val="241429818"/>
       </p:ext>
     </p:extLst>
   </p:cSld>
@@ -431,7 +442,7 @@
 </file>
 
 <file path=ppt/notesSlides/notesSlide1.xml><?xml version="1.0" encoding="utf-8"?>
-<p:notes xmlns:a="http://schemas.openxmlformats.org/drawingml/2006/main" xmlns:r="http://schemas.openxmlformats.org/officeDocument/2006/relationships" xmlns:mc="http://schemas.openxmlformats.org/markup-compatibility/2006" xmlns:mv="urn:schemas-microsoft-com:mac:vml" xmlns:p="http://schemas.openxmlformats.org/presentationml/2006/main" mc:Ignorable="mv" mc:PreserveAttributes="mv:*">
+<p:notes xmlns:a="http://schemas.openxmlformats.org/drawingml/2006/main" xmlns:r="http://schemas.openxmlformats.org/officeDocument/2006/relationships" xmlns:p="http://schemas.openxmlformats.org/presentationml/2006/main">
   <p:cSld>
     <p:spTree>
       <p:nvGrpSpPr>
@@ -522,7 +533,7 @@
     </p:spTree>
     <p:extLst>
       <p:ext uri="{BB962C8B-B14F-4D97-AF65-F5344CB8AC3E}">
-        <p14:creationId xmlns="" xmlns:a="http://schemas.openxmlformats.org/drawingml/2006/main" xmlns:r="http://schemas.openxmlformats.org/officeDocument/2006/relationships" xmlns:p="http://schemas.openxmlformats.org/presentationml/2006/main" xmlns:p14="http://schemas.microsoft.com/office/powerpoint/2010/main" xmlns:mv="urn:schemas-microsoft-com:mac:vml" xmlns:mc="http://schemas.openxmlformats.org/markup-compatibility/2006" val="1035143249"/>
+        <p14:creationId xmlns:p14="http://schemas.microsoft.com/office/powerpoint/2010/main" val="1035143249"/>
       </p:ext>
     </p:extLst>
   </p:cSld>
@@ -533,7 +544,7 @@
 </file>
 
 <file path=ppt/notesSlides/notesSlide2.xml><?xml version="1.0" encoding="utf-8"?>
-<p:notes xmlns:a="http://schemas.openxmlformats.org/drawingml/2006/main" xmlns:r="http://schemas.openxmlformats.org/officeDocument/2006/relationships" xmlns:mc="http://schemas.openxmlformats.org/markup-compatibility/2006" xmlns:mv="urn:schemas-microsoft-com:mac:vml" xmlns:p="http://schemas.openxmlformats.org/presentationml/2006/main" mc:Ignorable="mv" mc:PreserveAttributes="mv:*">
+<p:notes xmlns:a="http://schemas.openxmlformats.org/drawingml/2006/main" xmlns:r="http://schemas.openxmlformats.org/officeDocument/2006/relationships" xmlns:p="http://schemas.openxmlformats.org/presentationml/2006/main">
   <p:cSld>
     <p:spTree>
       <p:nvGrpSpPr>
@@ -622,7 +633,7 @@
     </p:spTree>
     <p:extLst>
       <p:ext uri="{BB962C8B-B14F-4D97-AF65-F5344CB8AC3E}">
-        <p14:creationId xmlns="" xmlns:a="http://schemas.openxmlformats.org/drawingml/2006/main" xmlns:r="http://schemas.openxmlformats.org/officeDocument/2006/relationships" xmlns:p="http://schemas.openxmlformats.org/presentationml/2006/main" xmlns:p14="http://schemas.microsoft.com/office/powerpoint/2010/main" xmlns:mv="urn:schemas-microsoft-com:mac:vml" xmlns:mc="http://schemas.openxmlformats.org/markup-compatibility/2006" val="2910537969"/>
+        <p14:creationId xmlns:p14="http://schemas.microsoft.com/office/powerpoint/2010/main" val="2910537969"/>
       </p:ext>
     </p:extLst>
   </p:cSld>
@@ -633,7 +644,7 @@
 </file>
 
 <file path=ppt/notesSlides/notesSlide3.xml><?xml version="1.0" encoding="utf-8"?>
-<p:notes xmlns:a="http://schemas.openxmlformats.org/drawingml/2006/main" xmlns:r="http://schemas.openxmlformats.org/officeDocument/2006/relationships" xmlns:mc="http://schemas.openxmlformats.org/markup-compatibility/2006" xmlns:mv="urn:schemas-microsoft-com:mac:vml" xmlns:p="http://schemas.openxmlformats.org/presentationml/2006/main" mc:Ignorable="mv" mc:PreserveAttributes="mv:*">
+<p:notes xmlns:a="http://schemas.openxmlformats.org/drawingml/2006/main" xmlns:r="http://schemas.openxmlformats.org/officeDocument/2006/relationships" xmlns:p="http://schemas.openxmlformats.org/presentationml/2006/main">
   <p:cSld>
     <p:spTree>
       <p:nvGrpSpPr>
@@ -722,7 +733,7 @@
     </p:spTree>
     <p:extLst>
       <p:ext uri="{BB962C8B-B14F-4D97-AF65-F5344CB8AC3E}">
-        <p14:creationId xmlns="" xmlns:a="http://schemas.openxmlformats.org/drawingml/2006/main" xmlns:r="http://schemas.openxmlformats.org/officeDocument/2006/relationships" xmlns:p="http://schemas.openxmlformats.org/presentationml/2006/main" xmlns:p14="http://schemas.microsoft.com/office/powerpoint/2010/main" xmlns:mv="urn:schemas-microsoft-com:mac:vml" xmlns:mc="http://schemas.openxmlformats.org/markup-compatibility/2006" val="2587382481"/>
+        <p14:creationId xmlns:p14="http://schemas.microsoft.com/office/powerpoint/2010/main" val="2587382481"/>
       </p:ext>
     </p:extLst>
   </p:cSld>
@@ -733,7 +744,7 @@
 </file>
 
 <file path=ppt/notesSlides/notesSlide4.xml><?xml version="1.0" encoding="utf-8"?>
-<p:notes xmlns:a="http://schemas.openxmlformats.org/drawingml/2006/main" xmlns:r="http://schemas.openxmlformats.org/officeDocument/2006/relationships" xmlns:mc="http://schemas.openxmlformats.org/markup-compatibility/2006" xmlns:mv="urn:schemas-microsoft-com:mac:vml" xmlns:p="http://schemas.openxmlformats.org/presentationml/2006/main" mc:Ignorable="mv" mc:PreserveAttributes="mv:*">
+<p:notes xmlns:a="http://schemas.openxmlformats.org/drawingml/2006/main" xmlns:r="http://schemas.openxmlformats.org/officeDocument/2006/relationships" xmlns:p="http://schemas.openxmlformats.org/presentationml/2006/main">
   <p:cSld>
     <p:spTree>
       <p:nvGrpSpPr>
@@ -822,7 +833,7 @@
     </p:spTree>
     <p:extLst>
       <p:ext uri="{BB962C8B-B14F-4D97-AF65-F5344CB8AC3E}">
-        <p14:creationId xmlns="" xmlns:a="http://schemas.openxmlformats.org/drawingml/2006/main" xmlns:r="http://schemas.openxmlformats.org/officeDocument/2006/relationships" xmlns:p="http://schemas.openxmlformats.org/presentationml/2006/main" xmlns:p14="http://schemas.microsoft.com/office/powerpoint/2010/main" xmlns:mv="urn:schemas-microsoft-com:mac:vml" xmlns:mc="http://schemas.openxmlformats.org/markup-compatibility/2006" val="1092528477"/>
+        <p14:creationId xmlns:p14="http://schemas.microsoft.com/office/powerpoint/2010/main" val="1092528477"/>
       </p:ext>
     </p:extLst>
   </p:cSld>
@@ -833,7 +844,7 @@
 </file>
 
 <file path=ppt/notesSlides/notesSlide5.xml><?xml version="1.0" encoding="utf-8"?>
-<p:notes xmlns:a="http://schemas.openxmlformats.org/drawingml/2006/main" xmlns:r="http://schemas.openxmlformats.org/officeDocument/2006/relationships" xmlns:mc="http://schemas.openxmlformats.org/markup-compatibility/2006" xmlns:mv="urn:schemas-microsoft-com:mac:vml" xmlns:p="http://schemas.openxmlformats.org/presentationml/2006/main" mc:Ignorable="mv" mc:PreserveAttributes="mv:*">
+<p:notes xmlns:a="http://schemas.openxmlformats.org/drawingml/2006/main" xmlns:r="http://schemas.openxmlformats.org/officeDocument/2006/relationships" xmlns:p="http://schemas.openxmlformats.org/presentationml/2006/main">
   <p:cSld>
     <p:spTree>
       <p:nvGrpSpPr>
@@ -922,7 +933,7 @@
     </p:spTree>
     <p:extLst>
       <p:ext uri="{BB962C8B-B14F-4D97-AF65-F5344CB8AC3E}">
-        <p14:creationId xmlns="" xmlns:a="http://schemas.openxmlformats.org/drawingml/2006/main" xmlns:r="http://schemas.openxmlformats.org/officeDocument/2006/relationships" xmlns:p="http://schemas.openxmlformats.org/presentationml/2006/main" xmlns:p14="http://schemas.microsoft.com/office/powerpoint/2010/main" xmlns:mv="urn:schemas-microsoft-com:mac:vml" xmlns:mc="http://schemas.openxmlformats.org/markup-compatibility/2006" val="1661121954"/>
+        <p14:creationId xmlns:p14="http://schemas.microsoft.com/office/powerpoint/2010/main" val="1661121954"/>
       </p:ext>
     </p:extLst>
   </p:cSld>
@@ -933,7 +944,7 @@
 </file>
 
 <file path=ppt/notesSlides/notesSlide6.xml><?xml version="1.0" encoding="utf-8"?>
-<p:notes xmlns:a="http://schemas.openxmlformats.org/drawingml/2006/main" xmlns:r="http://schemas.openxmlformats.org/officeDocument/2006/relationships" xmlns:mc="http://schemas.openxmlformats.org/markup-compatibility/2006" xmlns:mv="urn:schemas-microsoft-com:mac:vml" xmlns:p="http://schemas.openxmlformats.org/presentationml/2006/main" mc:Ignorable="mv" mc:PreserveAttributes="mv:*">
+<p:notes xmlns:a="http://schemas.openxmlformats.org/drawingml/2006/main" xmlns:r="http://schemas.openxmlformats.org/officeDocument/2006/relationships" xmlns:p="http://schemas.openxmlformats.org/presentationml/2006/main">
   <p:cSld>
     <p:spTree>
       <p:nvGrpSpPr>
@@ -1022,7 +1033,7 @@
     </p:spTree>
     <p:extLst>
       <p:ext uri="{BB962C8B-B14F-4D97-AF65-F5344CB8AC3E}">
-        <p14:creationId xmlns="" xmlns:a="http://schemas.openxmlformats.org/drawingml/2006/main" xmlns:r="http://schemas.openxmlformats.org/officeDocument/2006/relationships" xmlns:p="http://schemas.openxmlformats.org/presentationml/2006/main" xmlns:p14="http://schemas.microsoft.com/office/powerpoint/2010/main" xmlns:mv="urn:schemas-microsoft-com:mac:vml" xmlns:mc="http://schemas.openxmlformats.org/markup-compatibility/2006" val="1688920199"/>
+        <p14:creationId xmlns:p14="http://schemas.microsoft.com/office/powerpoint/2010/main" val="1688920199"/>
       </p:ext>
     </p:extLst>
   </p:cSld>
@@ -1033,7 +1044,7 @@
 </file>
 
 <file path=ppt/slideLayouts/slideLayout1.xml><?xml version="1.0" encoding="utf-8"?>
-<p:sldLayout xmlns:a="http://schemas.openxmlformats.org/drawingml/2006/main" xmlns:r="http://schemas.openxmlformats.org/officeDocument/2006/relationships" xmlns:mc="http://schemas.openxmlformats.org/markup-compatibility/2006" xmlns:mv="urn:schemas-microsoft-com:mac:vml" xmlns:p="http://schemas.openxmlformats.org/presentationml/2006/main" mc:Ignorable="mv" mc:PreserveAttributes="mv:*" showMasterSp="0" type="title" preserve="1">
+<p:sldLayout xmlns:a="http://schemas.openxmlformats.org/drawingml/2006/main" xmlns:r="http://schemas.openxmlformats.org/officeDocument/2006/relationships" xmlns:p="http://schemas.openxmlformats.org/presentationml/2006/main" showMasterSp="0" type="title" preserve="1">
   <p:cSld name="Title Slide">
     <p:spTree>
       <p:nvGrpSpPr>
@@ -1755,7 +1766,7 @@
             <a:fld id="{B61BEF0D-F0BB-DE4B-95CE-6DB70DBA9567}" type="datetimeFigureOut">
               <a:rPr lang="en-US" dirty="0"/>
               <a:pPr/>
-              <a:t>5/19/15</a:t>
+              <a:t>5/20/2015</a:t>
             </a:fld>
             <a:endParaRPr lang="en-US" dirty="0"/>
           </a:p>
@@ -1807,7 +1818,7 @@
     </p:spTree>
     <p:extLst>
       <p:ext uri="{BB962C8B-B14F-4D97-AF65-F5344CB8AC3E}">
-        <p14:creationId xmlns="" xmlns:a="http://schemas.openxmlformats.org/drawingml/2006/main" xmlns:r="http://schemas.openxmlformats.org/officeDocument/2006/relationships" xmlns:p="http://schemas.openxmlformats.org/presentationml/2006/main" xmlns:p14="http://schemas.microsoft.com/office/powerpoint/2010/main" xmlns:mv="urn:schemas-microsoft-com:mac:vml" xmlns:mc="http://schemas.openxmlformats.org/markup-compatibility/2006" val="624070842"/>
+        <p14:creationId xmlns:p14="http://schemas.microsoft.com/office/powerpoint/2010/main" val="624070842"/>
       </p:ext>
     </p:extLst>
   </p:cSld>
@@ -1818,7 +1829,7 @@
 </file>
 
 <file path=ppt/slideLayouts/slideLayout10.xml><?xml version="1.0" encoding="utf-8"?>
-<p:sldLayout xmlns:a="http://schemas.openxmlformats.org/drawingml/2006/main" xmlns:r="http://schemas.openxmlformats.org/officeDocument/2006/relationships" xmlns:mc="http://schemas.openxmlformats.org/markup-compatibility/2006" xmlns:mv="urn:schemas-microsoft-com:mac:vml" xmlns:p="http://schemas.openxmlformats.org/presentationml/2006/main" mc:Ignorable="mv" mc:PreserveAttributes="mv:*" preserve="1">
+<p:sldLayout xmlns:a="http://schemas.openxmlformats.org/drawingml/2006/main" xmlns:r="http://schemas.openxmlformats.org/officeDocument/2006/relationships" xmlns:p="http://schemas.openxmlformats.org/presentationml/2006/main" preserve="1">
   <p:cSld name="Title and Caption">
     <p:spTree>
       <p:nvGrpSpPr>
@@ -2083,7 +2094,7 @@
     </p:spTree>
     <p:extLst>
       <p:ext uri="{BB962C8B-B14F-4D97-AF65-F5344CB8AC3E}">
-        <p14:creationId xmlns="" xmlns:a="http://schemas.openxmlformats.org/drawingml/2006/main" xmlns:r="http://schemas.openxmlformats.org/officeDocument/2006/relationships" xmlns:p="http://schemas.openxmlformats.org/presentationml/2006/main" xmlns:p14="http://schemas.microsoft.com/office/powerpoint/2010/main" xmlns:mv="urn:schemas-microsoft-com:mac:vml" xmlns:mc="http://schemas.openxmlformats.org/markup-compatibility/2006" val="4166250518"/>
+        <p14:creationId xmlns:p14="http://schemas.microsoft.com/office/powerpoint/2010/main" val="4166250518"/>
       </p:ext>
     </p:extLst>
   </p:cSld>
@@ -2094,7 +2105,7 @@
 </file>
 
 <file path=ppt/slideLayouts/slideLayout11.xml><?xml version="1.0" encoding="utf-8"?>
-<p:sldLayout xmlns:a="http://schemas.openxmlformats.org/drawingml/2006/main" xmlns:r="http://schemas.openxmlformats.org/officeDocument/2006/relationships" xmlns:mc="http://schemas.openxmlformats.org/markup-compatibility/2006" xmlns:mv="urn:schemas-microsoft-com:mac:vml" xmlns:p="http://schemas.openxmlformats.org/presentationml/2006/main" mc:Ignorable="mv" mc:PreserveAttributes="mv:*" preserve="1">
+<p:sldLayout xmlns:a="http://schemas.openxmlformats.org/drawingml/2006/main" xmlns:r="http://schemas.openxmlformats.org/officeDocument/2006/relationships" xmlns:p="http://schemas.openxmlformats.org/presentationml/2006/main" preserve="1">
   <p:cSld name="Quote with Caption">
     <p:spTree>
       <p:nvGrpSpPr>
@@ -2512,7 +2523,7 @@
     </p:spTree>
     <p:extLst>
       <p:ext uri="{BB962C8B-B14F-4D97-AF65-F5344CB8AC3E}">
-        <p14:creationId xmlns="" xmlns:a="http://schemas.openxmlformats.org/drawingml/2006/main" xmlns:r="http://schemas.openxmlformats.org/officeDocument/2006/relationships" xmlns:p="http://schemas.openxmlformats.org/presentationml/2006/main" xmlns:p14="http://schemas.microsoft.com/office/powerpoint/2010/main" xmlns:mv="urn:schemas-microsoft-com:mac:vml" xmlns:mc="http://schemas.openxmlformats.org/markup-compatibility/2006" val="1836846174"/>
+        <p14:creationId xmlns:p14="http://schemas.microsoft.com/office/powerpoint/2010/main" val="1836846174"/>
       </p:ext>
     </p:extLst>
   </p:cSld>
@@ -2523,7 +2534,7 @@
 </file>
 
 <file path=ppt/slideLayouts/slideLayout12.xml><?xml version="1.0" encoding="utf-8"?>
-<p:sldLayout xmlns:a="http://schemas.openxmlformats.org/drawingml/2006/main" xmlns:r="http://schemas.openxmlformats.org/officeDocument/2006/relationships" xmlns:mc="http://schemas.openxmlformats.org/markup-compatibility/2006" xmlns:mv="urn:schemas-microsoft-com:mac:vml" xmlns:p="http://schemas.openxmlformats.org/presentationml/2006/main" mc:Ignorable="mv" mc:PreserveAttributes="mv:*" preserve="1">
+<p:sldLayout xmlns:a="http://schemas.openxmlformats.org/drawingml/2006/main" xmlns:r="http://schemas.openxmlformats.org/officeDocument/2006/relationships" xmlns:p="http://schemas.openxmlformats.org/presentationml/2006/main" preserve="1">
   <p:cSld name="Name Card">
     <p:spTree>
       <p:nvGrpSpPr>
@@ -2788,7 +2799,7 @@
     </p:spTree>
     <p:extLst>
       <p:ext uri="{BB962C8B-B14F-4D97-AF65-F5344CB8AC3E}">
-        <p14:creationId xmlns="" xmlns:a="http://schemas.openxmlformats.org/drawingml/2006/main" xmlns:r="http://schemas.openxmlformats.org/officeDocument/2006/relationships" xmlns:p="http://schemas.openxmlformats.org/presentationml/2006/main" xmlns:p14="http://schemas.microsoft.com/office/powerpoint/2010/main" xmlns:mv="urn:schemas-microsoft-com:mac:vml" xmlns:mc="http://schemas.openxmlformats.org/markup-compatibility/2006" val="2741947831"/>
+        <p14:creationId xmlns:p14="http://schemas.microsoft.com/office/powerpoint/2010/main" val="2741947831"/>
       </p:ext>
     </p:extLst>
   </p:cSld>
@@ -2799,7 +2810,7 @@
 </file>
 
 <file path=ppt/slideLayouts/slideLayout13.xml><?xml version="1.0" encoding="utf-8"?>
-<p:sldLayout xmlns:a="http://schemas.openxmlformats.org/drawingml/2006/main" xmlns:r="http://schemas.openxmlformats.org/officeDocument/2006/relationships" xmlns:mc="http://schemas.openxmlformats.org/markup-compatibility/2006" xmlns:mv="urn:schemas-microsoft-com:mac:vml" xmlns:p="http://schemas.openxmlformats.org/presentationml/2006/main" mc:Ignorable="mv" mc:PreserveAttributes="mv:*" preserve="1">
+<p:sldLayout xmlns:a="http://schemas.openxmlformats.org/drawingml/2006/main" xmlns:r="http://schemas.openxmlformats.org/officeDocument/2006/relationships" xmlns:p="http://schemas.openxmlformats.org/presentationml/2006/main" preserve="1">
   <p:cSld name="Quote Name Card">
     <p:spTree>
       <p:nvGrpSpPr>
@@ -3209,7 +3220,7 @@
     </p:spTree>
     <p:extLst>
       <p:ext uri="{BB962C8B-B14F-4D97-AF65-F5344CB8AC3E}">
-        <p14:creationId xmlns="" xmlns:a="http://schemas.openxmlformats.org/drawingml/2006/main" xmlns:r="http://schemas.openxmlformats.org/officeDocument/2006/relationships" xmlns:p="http://schemas.openxmlformats.org/presentationml/2006/main" xmlns:p14="http://schemas.microsoft.com/office/powerpoint/2010/main" xmlns:mv="urn:schemas-microsoft-com:mac:vml" xmlns:mc="http://schemas.openxmlformats.org/markup-compatibility/2006" val="1860616655"/>
+        <p14:creationId xmlns:p14="http://schemas.microsoft.com/office/powerpoint/2010/main" val="1860616655"/>
       </p:ext>
     </p:extLst>
   </p:cSld>
@@ -3220,7 +3231,7 @@
 </file>
 
 <file path=ppt/slideLayouts/slideLayout14.xml><?xml version="1.0" encoding="utf-8"?>
-<p:sldLayout xmlns:a="http://schemas.openxmlformats.org/drawingml/2006/main" xmlns:r="http://schemas.openxmlformats.org/officeDocument/2006/relationships" xmlns:mc="http://schemas.openxmlformats.org/markup-compatibility/2006" xmlns:mv="urn:schemas-microsoft-com:mac:vml" xmlns:p="http://schemas.openxmlformats.org/presentationml/2006/main" mc:Ignorable="mv" mc:PreserveAttributes="mv:*" preserve="1">
+<p:sldLayout xmlns:a="http://schemas.openxmlformats.org/drawingml/2006/main" xmlns:r="http://schemas.openxmlformats.org/officeDocument/2006/relationships" xmlns:p="http://schemas.openxmlformats.org/presentationml/2006/main" preserve="1">
   <p:cSld name="True or False">
     <p:spTree>
       <p:nvGrpSpPr>
@@ -3545,7 +3556,7 @@
     </p:spTree>
     <p:extLst>
       <p:ext uri="{BB962C8B-B14F-4D97-AF65-F5344CB8AC3E}">
-        <p14:creationId xmlns="" xmlns:a="http://schemas.openxmlformats.org/drawingml/2006/main" xmlns:r="http://schemas.openxmlformats.org/officeDocument/2006/relationships" xmlns:p="http://schemas.openxmlformats.org/presentationml/2006/main" xmlns:p14="http://schemas.microsoft.com/office/powerpoint/2010/main" xmlns:mv="urn:schemas-microsoft-com:mac:vml" xmlns:mc="http://schemas.openxmlformats.org/markup-compatibility/2006" val="760552747"/>
+        <p14:creationId xmlns:p14="http://schemas.microsoft.com/office/powerpoint/2010/main" val="760552747"/>
       </p:ext>
     </p:extLst>
   </p:cSld>
@@ -3556,7 +3567,7 @@
 </file>
 
 <file path=ppt/slideLayouts/slideLayout15.xml><?xml version="1.0" encoding="utf-8"?>
-<p:sldLayout xmlns:a="http://schemas.openxmlformats.org/drawingml/2006/main" xmlns:r="http://schemas.openxmlformats.org/officeDocument/2006/relationships" xmlns:mc="http://schemas.openxmlformats.org/markup-compatibility/2006" xmlns:mv="urn:schemas-microsoft-com:mac:vml" xmlns:p="http://schemas.openxmlformats.org/presentationml/2006/main" mc:Ignorable="mv" mc:PreserveAttributes="mv:*" type="vertTx" preserve="1">
+<p:sldLayout xmlns:a="http://schemas.openxmlformats.org/drawingml/2006/main" xmlns:r="http://schemas.openxmlformats.org/officeDocument/2006/relationships" xmlns:p="http://schemas.openxmlformats.org/presentationml/2006/main" type="vertTx" preserve="1">
   <p:cSld name="Title and Vertical Text">
     <p:spTree>
       <p:nvGrpSpPr>
@@ -3740,7 +3751,7 @@
     </p:spTree>
     <p:extLst>
       <p:ext uri="{BB962C8B-B14F-4D97-AF65-F5344CB8AC3E}">
-        <p14:creationId xmlns="" xmlns:a="http://schemas.openxmlformats.org/drawingml/2006/main" xmlns:r="http://schemas.openxmlformats.org/officeDocument/2006/relationships" xmlns:p="http://schemas.openxmlformats.org/presentationml/2006/main" xmlns:p14="http://schemas.microsoft.com/office/powerpoint/2010/main" xmlns:mv="urn:schemas-microsoft-com:mac:vml" xmlns:mc="http://schemas.openxmlformats.org/markup-compatibility/2006" val="4005121510"/>
+        <p14:creationId xmlns:p14="http://schemas.microsoft.com/office/powerpoint/2010/main" val="4005121510"/>
       </p:ext>
     </p:extLst>
   </p:cSld>
@@ -3751,7 +3762,7 @@
 </file>
 
 <file path=ppt/slideLayouts/slideLayout16.xml><?xml version="1.0" encoding="utf-8"?>
-<p:sldLayout xmlns:a="http://schemas.openxmlformats.org/drawingml/2006/main" xmlns:r="http://schemas.openxmlformats.org/officeDocument/2006/relationships" xmlns:mc="http://schemas.openxmlformats.org/markup-compatibility/2006" xmlns:mv="urn:schemas-microsoft-com:mac:vml" xmlns:p="http://schemas.openxmlformats.org/presentationml/2006/main" mc:Ignorable="mv" mc:PreserveAttributes="mv:*" type="vertTitleAndTx" preserve="1">
+<p:sldLayout xmlns:a="http://schemas.openxmlformats.org/drawingml/2006/main" xmlns:r="http://schemas.openxmlformats.org/officeDocument/2006/relationships" xmlns:p="http://schemas.openxmlformats.org/presentationml/2006/main" type="vertTitleAndTx" preserve="1">
   <p:cSld name="Vertical Title and Text">
     <p:spTree>
       <p:nvGrpSpPr>
@@ -3945,7 +3956,7 @@
     </p:spTree>
     <p:extLst>
       <p:ext uri="{BB962C8B-B14F-4D97-AF65-F5344CB8AC3E}">
-        <p14:creationId xmlns="" xmlns:a="http://schemas.openxmlformats.org/drawingml/2006/main" xmlns:r="http://schemas.openxmlformats.org/officeDocument/2006/relationships" xmlns:p="http://schemas.openxmlformats.org/presentationml/2006/main" xmlns:p14="http://schemas.microsoft.com/office/powerpoint/2010/main" xmlns:mv="urn:schemas-microsoft-com:mac:vml" xmlns:mc="http://schemas.openxmlformats.org/markup-compatibility/2006" val="4173657723"/>
+        <p14:creationId xmlns:p14="http://schemas.microsoft.com/office/powerpoint/2010/main" val="4173657723"/>
       </p:ext>
     </p:extLst>
   </p:cSld>
@@ -3956,7 +3967,7 @@
 </file>
 
 <file path=ppt/slideLayouts/slideLayout2.xml><?xml version="1.0" encoding="utf-8"?>
-<p:sldLayout xmlns:a="http://schemas.openxmlformats.org/drawingml/2006/main" xmlns:r="http://schemas.openxmlformats.org/officeDocument/2006/relationships" xmlns:mc="http://schemas.openxmlformats.org/markup-compatibility/2006" xmlns:mv="urn:schemas-microsoft-com:mac:vml" xmlns:p="http://schemas.openxmlformats.org/presentationml/2006/main" mc:Ignorable="mv" mc:PreserveAttributes="mv:*" type="obj" preserve="1">
+<p:sldLayout xmlns:a="http://schemas.openxmlformats.org/drawingml/2006/main" xmlns:r="http://schemas.openxmlformats.org/officeDocument/2006/relationships" xmlns:p="http://schemas.openxmlformats.org/presentationml/2006/main" type="obj" preserve="1">
   <p:cSld name="Title and Content">
     <p:spTree>
       <p:nvGrpSpPr>
@@ -4146,7 +4157,7 @@
     </p:spTree>
     <p:extLst>
       <p:ext uri="{BB962C8B-B14F-4D97-AF65-F5344CB8AC3E}">
-        <p14:creationId xmlns="" xmlns:a="http://schemas.openxmlformats.org/drawingml/2006/main" xmlns:r="http://schemas.openxmlformats.org/officeDocument/2006/relationships" xmlns:p="http://schemas.openxmlformats.org/presentationml/2006/main" xmlns:p14="http://schemas.microsoft.com/office/powerpoint/2010/main" xmlns:mv="urn:schemas-microsoft-com:mac:vml" xmlns:mc="http://schemas.openxmlformats.org/markup-compatibility/2006" val="1229514224"/>
+        <p14:creationId xmlns:p14="http://schemas.microsoft.com/office/powerpoint/2010/main" val="1229514224"/>
       </p:ext>
     </p:extLst>
   </p:cSld>
@@ -4157,7 +4168,7 @@
 </file>
 
 <file path=ppt/slideLayouts/slideLayout3.xml><?xml version="1.0" encoding="utf-8"?>
-<p:sldLayout xmlns:a="http://schemas.openxmlformats.org/drawingml/2006/main" xmlns:r="http://schemas.openxmlformats.org/officeDocument/2006/relationships" xmlns:mc="http://schemas.openxmlformats.org/markup-compatibility/2006" xmlns:mv="urn:schemas-microsoft-com:mac:vml" xmlns:p="http://schemas.openxmlformats.org/presentationml/2006/main" mc:Ignorable="mv" mc:PreserveAttributes="mv:*" type="secHead" preserve="1">
+<p:sldLayout xmlns:a="http://schemas.openxmlformats.org/drawingml/2006/main" xmlns:r="http://schemas.openxmlformats.org/officeDocument/2006/relationships" xmlns:p="http://schemas.openxmlformats.org/presentationml/2006/main" type="secHead" preserve="1">
   <p:cSld name="Section Header">
     <p:spTree>
       <p:nvGrpSpPr>
@@ -4418,7 +4429,7 @@
     </p:spTree>
     <p:extLst>
       <p:ext uri="{BB962C8B-B14F-4D97-AF65-F5344CB8AC3E}">
-        <p14:creationId xmlns="" xmlns:a="http://schemas.openxmlformats.org/drawingml/2006/main" xmlns:r="http://schemas.openxmlformats.org/officeDocument/2006/relationships" xmlns:p="http://schemas.openxmlformats.org/presentationml/2006/main" xmlns:p14="http://schemas.microsoft.com/office/powerpoint/2010/main" xmlns:mv="urn:schemas-microsoft-com:mac:vml" xmlns:mc="http://schemas.openxmlformats.org/markup-compatibility/2006" val="1333608137"/>
+        <p14:creationId xmlns:p14="http://schemas.microsoft.com/office/powerpoint/2010/main" val="1333608137"/>
       </p:ext>
     </p:extLst>
   </p:cSld>
@@ -4429,7 +4440,7 @@
 </file>
 
 <file path=ppt/slideLayouts/slideLayout4.xml><?xml version="1.0" encoding="utf-8"?>
-<p:sldLayout xmlns:a="http://schemas.openxmlformats.org/drawingml/2006/main" xmlns:r="http://schemas.openxmlformats.org/officeDocument/2006/relationships" xmlns:mc="http://schemas.openxmlformats.org/markup-compatibility/2006" xmlns:mv="urn:schemas-microsoft-com:mac:vml" xmlns:p="http://schemas.openxmlformats.org/presentationml/2006/main" mc:Ignorable="mv" mc:PreserveAttributes="mv:*" type="twoObj" preserve="1">
+<p:sldLayout xmlns:a="http://schemas.openxmlformats.org/drawingml/2006/main" xmlns:r="http://schemas.openxmlformats.org/officeDocument/2006/relationships" xmlns:p="http://schemas.openxmlformats.org/presentationml/2006/main" type="twoObj" preserve="1">
   <p:cSld name="Two Content">
     <p:spTree>
       <p:nvGrpSpPr>
@@ -4675,7 +4686,7 @@
     </p:spTree>
     <p:extLst>
       <p:ext uri="{BB962C8B-B14F-4D97-AF65-F5344CB8AC3E}">
-        <p14:creationId xmlns="" xmlns:a="http://schemas.openxmlformats.org/drawingml/2006/main" xmlns:r="http://schemas.openxmlformats.org/officeDocument/2006/relationships" xmlns:p="http://schemas.openxmlformats.org/presentationml/2006/main" xmlns:p14="http://schemas.microsoft.com/office/powerpoint/2010/main" xmlns:mv="urn:schemas-microsoft-com:mac:vml" xmlns:mc="http://schemas.openxmlformats.org/markup-compatibility/2006" val="4201345582"/>
+        <p14:creationId xmlns:p14="http://schemas.microsoft.com/office/powerpoint/2010/main" val="4201345582"/>
       </p:ext>
     </p:extLst>
   </p:cSld>
@@ -4686,7 +4697,7 @@
 </file>
 
 <file path=ppt/slideLayouts/slideLayout5.xml><?xml version="1.0" encoding="utf-8"?>
-<p:sldLayout xmlns:a="http://schemas.openxmlformats.org/drawingml/2006/main" xmlns:r="http://schemas.openxmlformats.org/officeDocument/2006/relationships" xmlns:mc="http://schemas.openxmlformats.org/markup-compatibility/2006" xmlns:mv="urn:schemas-microsoft-com:mac:vml" xmlns:p="http://schemas.openxmlformats.org/presentationml/2006/main" mc:Ignorable="mv" mc:PreserveAttributes="mv:*" type="twoTxTwoObj" preserve="1">
+<p:sldLayout xmlns:a="http://schemas.openxmlformats.org/drawingml/2006/main" xmlns:r="http://schemas.openxmlformats.org/officeDocument/2006/relationships" xmlns:p="http://schemas.openxmlformats.org/presentationml/2006/main" type="twoTxTwoObj" preserve="1">
   <p:cSld name="Comparison">
     <p:spTree>
       <p:nvGrpSpPr>
@@ -5074,7 +5085,7 @@
     </p:spTree>
     <p:extLst>
       <p:ext uri="{BB962C8B-B14F-4D97-AF65-F5344CB8AC3E}">
-        <p14:creationId xmlns="" xmlns:a="http://schemas.openxmlformats.org/drawingml/2006/main" xmlns:r="http://schemas.openxmlformats.org/officeDocument/2006/relationships" xmlns:p="http://schemas.openxmlformats.org/presentationml/2006/main" xmlns:p14="http://schemas.microsoft.com/office/powerpoint/2010/main" xmlns:mv="urn:schemas-microsoft-com:mac:vml" xmlns:mc="http://schemas.openxmlformats.org/markup-compatibility/2006" val="3029459635"/>
+        <p14:creationId xmlns:p14="http://schemas.microsoft.com/office/powerpoint/2010/main" val="3029459635"/>
       </p:ext>
     </p:extLst>
   </p:cSld>
@@ -5085,7 +5096,7 @@
 </file>
 
 <file path=ppt/slideLayouts/slideLayout6.xml><?xml version="1.0" encoding="utf-8"?>
-<p:sldLayout xmlns:a="http://schemas.openxmlformats.org/drawingml/2006/main" xmlns:r="http://schemas.openxmlformats.org/officeDocument/2006/relationships" xmlns:mc="http://schemas.openxmlformats.org/markup-compatibility/2006" xmlns:mv="urn:schemas-microsoft-com:mac:vml" xmlns:p="http://schemas.openxmlformats.org/presentationml/2006/main" mc:Ignorable="mv" mc:PreserveAttributes="mv:*" type="titleOnly" preserve="1">
+<p:sldLayout xmlns:a="http://schemas.openxmlformats.org/drawingml/2006/main" xmlns:r="http://schemas.openxmlformats.org/officeDocument/2006/relationships" xmlns:p="http://schemas.openxmlformats.org/presentationml/2006/main" type="titleOnly" preserve="1">
   <p:cSld name="Title Only">
     <p:spTree>
       <p:nvGrpSpPr>
@@ -5147,7 +5158,7 @@
             <a:fld id="{B61BEF0D-F0BB-DE4B-95CE-6DB70DBA9567}" type="datetimeFigureOut">
               <a:rPr lang="en-US" dirty="0"/>
               <a:pPr/>
-              <a:t>5/19/15</a:t>
+              <a:t>5/20/2015</a:t>
             </a:fld>
             <a:endParaRPr lang="en-US" dirty="0"/>
           </a:p>
@@ -5199,7 +5210,7 @@
     </p:spTree>
     <p:extLst>
       <p:ext uri="{BB962C8B-B14F-4D97-AF65-F5344CB8AC3E}">
-        <p14:creationId xmlns="" xmlns:a="http://schemas.openxmlformats.org/drawingml/2006/main" xmlns:r="http://schemas.openxmlformats.org/officeDocument/2006/relationships" xmlns:p="http://schemas.openxmlformats.org/presentationml/2006/main" xmlns:p14="http://schemas.microsoft.com/office/powerpoint/2010/main" xmlns:mv="urn:schemas-microsoft-com:mac:vml" xmlns:mc="http://schemas.openxmlformats.org/markup-compatibility/2006" val="976045021"/>
+        <p14:creationId xmlns:p14="http://schemas.microsoft.com/office/powerpoint/2010/main" val="976045021"/>
       </p:ext>
     </p:extLst>
   </p:cSld>
@@ -5210,7 +5221,7 @@
 </file>
 
 <file path=ppt/slideLayouts/slideLayout7.xml><?xml version="1.0" encoding="utf-8"?>
-<p:sldLayout xmlns:a="http://schemas.openxmlformats.org/drawingml/2006/main" xmlns:r="http://schemas.openxmlformats.org/officeDocument/2006/relationships" xmlns:mc="http://schemas.openxmlformats.org/markup-compatibility/2006" xmlns:mv="urn:schemas-microsoft-com:mac:vml" xmlns:p="http://schemas.openxmlformats.org/presentationml/2006/main" mc:Ignorable="mv" mc:PreserveAttributes="mv:*" type="blank" preserve="1">
+<p:sldLayout xmlns:a="http://schemas.openxmlformats.org/drawingml/2006/main" xmlns:r="http://schemas.openxmlformats.org/officeDocument/2006/relationships" xmlns:p="http://schemas.openxmlformats.org/presentationml/2006/main" type="blank" preserve="1">
   <p:cSld name="Blank">
     <p:spTree>
       <p:nvGrpSpPr>
@@ -5319,7 +5330,7 @@
     </p:spTree>
     <p:extLst>
       <p:ext uri="{BB962C8B-B14F-4D97-AF65-F5344CB8AC3E}">
-        <p14:creationId xmlns="" xmlns:a="http://schemas.openxmlformats.org/drawingml/2006/main" xmlns:r="http://schemas.openxmlformats.org/officeDocument/2006/relationships" xmlns:p="http://schemas.openxmlformats.org/presentationml/2006/main" xmlns:p14="http://schemas.microsoft.com/office/powerpoint/2010/main" xmlns:mv="urn:schemas-microsoft-com:mac:vml" xmlns:mc="http://schemas.openxmlformats.org/markup-compatibility/2006" val="922579189"/>
+        <p14:creationId xmlns:p14="http://schemas.microsoft.com/office/powerpoint/2010/main" val="922579189"/>
       </p:ext>
     </p:extLst>
   </p:cSld>
@@ -5330,7 +5341,7 @@
 </file>
 
 <file path=ppt/slideLayouts/slideLayout8.xml><?xml version="1.0" encoding="utf-8"?>
-<p:sldLayout xmlns:a="http://schemas.openxmlformats.org/drawingml/2006/main" xmlns:r="http://schemas.openxmlformats.org/officeDocument/2006/relationships" xmlns:mc="http://schemas.openxmlformats.org/markup-compatibility/2006" xmlns:mv="urn:schemas-microsoft-com:mac:vml" xmlns:p="http://schemas.openxmlformats.org/presentationml/2006/main" mc:Ignorable="mv" mc:PreserveAttributes="mv:*" type="objTx" preserve="1">
+<p:sldLayout xmlns:a="http://schemas.openxmlformats.org/drawingml/2006/main" xmlns:r="http://schemas.openxmlformats.org/officeDocument/2006/relationships" xmlns:p="http://schemas.openxmlformats.org/presentationml/2006/main" type="objTx" preserve="1">
   <p:cSld name="Content with Caption">
     <p:spTree>
       <p:nvGrpSpPr>
@@ -5599,7 +5610,7 @@
     </p:spTree>
     <p:extLst>
       <p:ext uri="{BB962C8B-B14F-4D97-AF65-F5344CB8AC3E}">
-        <p14:creationId xmlns="" xmlns:a="http://schemas.openxmlformats.org/drawingml/2006/main" xmlns:r="http://schemas.openxmlformats.org/officeDocument/2006/relationships" xmlns:p="http://schemas.openxmlformats.org/presentationml/2006/main" xmlns:p14="http://schemas.microsoft.com/office/powerpoint/2010/main" xmlns:mv="urn:schemas-microsoft-com:mac:vml" xmlns:mc="http://schemas.openxmlformats.org/markup-compatibility/2006" val="3983644491"/>
+        <p14:creationId xmlns:p14="http://schemas.microsoft.com/office/powerpoint/2010/main" val="3983644491"/>
       </p:ext>
     </p:extLst>
   </p:cSld>
@@ -5610,7 +5621,7 @@
 </file>
 
 <file path=ppt/slideLayouts/slideLayout9.xml><?xml version="1.0" encoding="utf-8"?>
-<p:sldLayout xmlns:a="http://schemas.openxmlformats.org/drawingml/2006/main" xmlns:r="http://schemas.openxmlformats.org/officeDocument/2006/relationships" xmlns:mc="http://schemas.openxmlformats.org/markup-compatibility/2006" xmlns:mv="urn:schemas-microsoft-com:mac:vml" xmlns:p="http://schemas.openxmlformats.org/presentationml/2006/main" mc:Ignorable="mv" mc:PreserveAttributes="mv:*" type="picTx" preserve="1">
+<p:sldLayout xmlns:a="http://schemas.openxmlformats.org/drawingml/2006/main" xmlns:r="http://schemas.openxmlformats.org/officeDocument/2006/relationships" xmlns:p="http://schemas.openxmlformats.org/presentationml/2006/main" type="picTx" preserve="1">
   <p:cSld name="Picture with Caption">
     <p:spTree>
       <p:nvGrpSpPr>
@@ -5887,7 +5898,7 @@
     </p:spTree>
     <p:extLst>
       <p:ext uri="{BB962C8B-B14F-4D97-AF65-F5344CB8AC3E}">
-        <p14:creationId xmlns="" xmlns:a="http://schemas.openxmlformats.org/drawingml/2006/main" xmlns:r="http://schemas.openxmlformats.org/officeDocument/2006/relationships" xmlns:p="http://schemas.openxmlformats.org/presentationml/2006/main" xmlns:p14="http://schemas.microsoft.com/office/powerpoint/2010/main" xmlns:mv="urn:schemas-microsoft-com:mac:vml" xmlns:mc="http://schemas.openxmlformats.org/markup-compatibility/2006" val="2691023631"/>
+        <p14:creationId xmlns:p14="http://schemas.microsoft.com/office/powerpoint/2010/main" val="2691023631"/>
       </p:ext>
     </p:extLst>
   </p:cSld>
@@ -5898,7 +5909,7 @@
 </file>
 
 <file path=ppt/slideMasters/slideMaster1.xml><?xml version="1.0" encoding="utf-8"?>
-<p:sldMaster xmlns:a="http://schemas.openxmlformats.org/drawingml/2006/main" xmlns:r="http://schemas.openxmlformats.org/officeDocument/2006/relationships" xmlns:mc="http://schemas.openxmlformats.org/markup-compatibility/2006" xmlns:mv="urn:schemas-microsoft-com:mac:vml" xmlns:p="http://schemas.openxmlformats.org/presentationml/2006/main" mc:Ignorable="mv" mc:PreserveAttributes="mv:*">
+<p:sldMaster xmlns:a="http://schemas.openxmlformats.org/drawingml/2006/main" xmlns:r="http://schemas.openxmlformats.org/officeDocument/2006/relationships" xmlns:p="http://schemas.openxmlformats.org/presentationml/2006/main">
   <p:cSld>
     <p:bg>
       <p:bgRef idx="1001">
@@ -6689,7 +6700,7 @@
     </p:spTree>
     <p:extLst>
       <p:ext uri="{BB962C8B-B14F-4D97-AF65-F5344CB8AC3E}">
-        <p14:creationId xmlns="" xmlns:a="http://schemas.openxmlformats.org/drawingml/2006/main" xmlns:r="http://schemas.openxmlformats.org/officeDocument/2006/relationships" xmlns:p="http://schemas.openxmlformats.org/presentationml/2006/main" xmlns:p14="http://schemas.microsoft.com/office/powerpoint/2010/main" xmlns:mv="urn:schemas-microsoft-com:mac:vml" xmlns:mc="http://schemas.openxmlformats.org/markup-compatibility/2006" val="3586329599"/>
+        <p14:creationId xmlns:p14="http://schemas.microsoft.com/office/powerpoint/2010/main" val="3586329599"/>
       </p:ext>
     </p:extLst>
   </p:cSld>
@@ -7112,7 +7123,7 @@
 </file>
 
 <file path=ppt/slides/slide1.xml><?xml version="1.0" encoding="utf-8"?>
-<p:sld xmlns:a="http://schemas.openxmlformats.org/drawingml/2006/main" xmlns:r="http://schemas.openxmlformats.org/officeDocument/2006/relationships" xmlns:mc="http://schemas.openxmlformats.org/markup-compatibility/2006" xmlns:mv="urn:schemas-microsoft-com:mac:vml" xmlns:p="http://schemas.openxmlformats.org/presentationml/2006/main" mc:Ignorable="mv" mc:PreserveAttributes="mv:*">
+<p:sld xmlns:a="http://schemas.openxmlformats.org/drawingml/2006/main" xmlns:r="http://schemas.openxmlformats.org/officeDocument/2006/relationships" xmlns:p="http://schemas.openxmlformats.org/presentationml/2006/main">
   <p:cSld>
     <p:spTree>
       <p:nvGrpSpPr>
@@ -7289,7 +7300,7 @@
 </file>
 
 <file path=ppt/slides/slide10.xml><?xml version="1.0" encoding="utf-8"?>
-<p:sld xmlns:a="http://schemas.openxmlformats.org/drawingml/2006/main" xmlns:r="http://schemas.openxmlformats.org/officeDocument/2006/relationships" xmlns:mc="http://schemas.openxmlformats.org/markup-compatibility/2006" xmlns:mv="urn:schemas-microsoft-com:mac:vml" xmlns:p="http://schemas.openxmlformats.org/presentationml/2006/main" mc:Ignorable="mv" mc:PreserveAttributes="mv:*">
+<p:sld xmlns:a="http://schemas.openxmlformats.org/drawingml/2006/main" xmlns:r="http://schemas.openxmlformats.org/officeDocument/2006/relationships" xmlns:p="http://schemas.openxmlformats.org/presentationml/2006/main">
   <p:cSld>
     <p:spTree>
       <p:nvGrpSpPr>
@@ -7584,7 +7595,7 @@
 </file>
 
 <file path=ppt/slides/slide11.xml><?xml version="1.0" encoding="utf-8"?>
-<p:sld xmlns:a="http://schemas.openxmlformats.org/drawingml/2006/main" xmlns:r="http://schemas.openxmlformats.org/officeDocument/2006/relationships" xmlns:mc="http://schemas.openxmlformats.org/markup-compatibility/2006" xmlns:mv="urn:schemas-microsoft-com:mac:vml" xmlns:p="http://schemas.openxmlformats.org/presentationml/2006/main" mc:Ignorable="mv" mc:PreserveAttributes="mv:*">
+<p:sld xmlns:a="http://schemas.openxmlformats.org/drawingml/2006/main" xmlns:r="http://schemas.openxmlformats.org/officeDocument/2006/relationships" xmlns:p="http://schemas.openxmlformats.org/presentationml/2006/main">
   <p:cSld>
     <p:spTree>
       <p:nvGrpSpPr>
@@ -7726,7 +7737,7 @@
 </file>
 
 <file path=ppt/slides/slide12.xml><?xml version="1.0" encoding="utf-8"?>
-<p:sld xmlns:a="http://schemas.openxmlformats.org/drawingml/2006/main" xmlns:r="http://schemas.openxmlformats.org/officeDocument/2006/relationships" xmlns:mc="http://schemas.openxmlformats.org/markup-compatibility/2006" xmlns:mv="urn:schemas-microsoft-com:mac:vml" xmlns:p="http://schemas.openxmlformats.org/presentationml/2006/main" mc:Ignorable="mv" mc:PreserveAttributes="mv:*">
+<p:sld xmlns:a="http://schemas.openxmlformats.org/drawingml/2006/main" xmlns:r="http://schemas.openxmlformats.org/officeDocument/2006/relationships" xmlns:p="http://schemas.openxmlformats.org/presentationml/2006/main">
   <p:cSld>
     <p:spTree>
       <p:nvGrpSpPr>
@@ -7868,7 +7879,7 @@
 </file>
 
 <file path=ppt/slides/slide13.xml><?xml version="1.0" encoding="utf-8"?>
-<p:sld xmlns:a="http://schemas.openxmlformats.org/drawingml/2006/main" xmlns:r="http://schemas.openxmlformats.org/officeDocument/2006/relationships" xmlns:mc="http://schemas.openxmlformats.org/markup-compatibility/2006" xmlns:mv="urn:schemas-microsoft-com:mac:vml" xmlns:p="http://schemas.openxmlformats.org/presentationml/2006/main" mc:Ignorable="mv" mc:PreserveAttributes="mv:*">
+<p:sld xmlns:a="http://schemas.openxmlformats.org/drawingml/2006/main" xmlns:r="http://schemas.openxmlformats.org/officeDocument/2006/relationships" xmlns:p="http://schemas.openxmlformats.org/presentationml/2006/main">
   <p:cSld>
     <p:spTree>
       <p:nvGrpSpPr>
@@ -8010,7 +8021,7 @@
 </file>
 
 <file path=ppt/slides/slide14.xml><?xml version="1.0" encoding="utf-8"?>
-<p:sld xmlns:a="http://schemas.openxmlformats.org/drawingml/2006/main" xmlns:r="http://schemas.openxmlformats.org/officeDocument/2006/relationships" xmlns:mc="http://schemas.openxmlformats.org/markup-compatibility/2006" xmlns:mv="urn:schemas-microsoft-com:mac:vml" xmlns:p="http://schemas.openxmlformats.org/presentationml/2006/main" mc:Ignorable="mv" mc:PreserveAttributes="mv:*">
+<p:sld xmlns:a="http://schemas.openxmlformats.org/drawingml/2006/main" xmlns:r="http://schemas.openxmlformats.org/officeDocument/2006/relationships" xmlns:p="http://schemas.openxmlformats.org/presentationml/2006/main">
   <p:cSld>
     <p:spTree>
       <p:nvGrpSpPr>
@@ -8296,7 +8307,7 @@
 </file>
 
 <file path=ppt/slides/slide15.xml><?xml version="1.0" encoding="utf-8"?>
-<p:sld xmlns:a="http://schemas.openxmlformats.org/drawingml/2006/main" xmlns:r="http://schemas.openxmlformats.org/officeDocument/2006/relationships" xmlns:mc="http://schemas.openxmlformats.org/markup-compatibility/2006" xmlns:mv="urn:schemas-microsoft-com:mac:vml" xmlns:p="http://schemas.openxmlformats.org/presentationml/2006/main" mc:Ignorable="mv" mc:PreserveAttributes="mv:*">
+<p:sld xmlns:a="http://schemas.openxmlformats.org/drawingml/2006/main" xmlns:r="http://schemas.openxmlformats.org/officeDocument/2006/relationships" xmlns:p="http://schemas.openxmlformats.org/presentationml/2006/main">
   <p:cSld>
     <p:spTree>
       <p:nvGrpSpPr>
@@ -8446,7 +8457,7 @@
 </file>
 
 <file path=ppt/slides/slide16.xml><?xml version="1.0" encoding="utf-8"?>
-<p:sld xmlns:a="http://schemas.openxmlformats.org/drawingml/2006/main" xmlns:r="http://schemas.openxmlformats.org/officeDocument/2006/relationships" xmlns:mc="http://schemas.openxmlformats.org/markup-compatibility/2006" xmlns:mv="urn:schemas-microsoft-com:mac:vml" xmlns:p="http://schemas.openxmlformats.org/presentationml/2006/main" mc:Ignorable="mv" mc:PreserveAttributes="mv:*">
+<p:sld xmlns:a="http://schemas.openxmlformats.org/drawingml/2006/main" xmlns:r="http://schemas.openxmlformats.org/officeDocument/2006/relationships" xmlns:p="http://schemas.openxmlformats.org/presentationml/2006/main">
   <p:cSld>
     <p:spTree>
       <p:nvGrpSpPr>
@@ -8590,7 +8601,7 @@
 </file>
 
 <file path=ppt/slides/slide17.xml><?xml version="1.0" encoding="utf-8"?>
-<p:sld xmlns:a="http://schemas.openxmlformats.org/drawingml/2006/main" xmlns:r="http://schemas.openxmlformats.org/officeDocument/2006/relationships" xmlns:mc="http://schemas.openxmlformats.org/markup-compatibility/2006" xmlns:mv="urn:schemas-microsoft-com:mac:vml" xmlns:p="http://schemas.openxmlformats.org/presentationml/2006/main" mc:Ignorable="mv" mc:PreserveAttributes="mv:*">
+<p:sld xmlns:a="http://schemas.openxmlformats.org/drawingml/2006/main" xmlns:r="http://schemas.openxmlformats.org/officeDocument/2006/relationships" xmlns:p="http://schemas.openxmlformats.org/presentationml/2006/main">
   <p:cSld>
     <p:spTree>
       <p:nvGrpSpPr>
@@ -8719,7 +8730,7 @@
 </file>
 
 <file path=ppt/slides/slide18.xml><?xml version="1.0" encoding="utf-8"?>
-<p:sld xmlns:a="http://schemas.openxmlformats.org/drawingml/2006/main" xmlns:r="http://schemas.openxmlformats.org/officeDocument/2006/relationships" xmlns:mc="http://schemas.openxmlformats.org/markup-compatibility/2006" xmlns:mv="urn:schemas-microsoft-com:mac:vml" xmlns:p="http://schemas.openxmlformats.org/presentationml/2006/main" mc:Ignorable="mv" mc:PreserveAttributes="mv:*">
+<p:sld xmlns:a="http://schemas.openxmlformats.org/drawingml/2006/main" xmlns:r="http://schemas.openxmlformats.org/officeDocument/2006/relationships" xmlns:p="http://schemas.openxmlformats.org/presentationml/2006/main">
   <p:cSld>
     <p:spTree>
       <p:nvGrpSpPr>
@@ -8886,7 +8897,7 @@
     </p:spTree>
     <p:extLst>
       <p:ext uri="{BB962C8B-B14F-4D97-AF65-F5344CB8AC3E}">
-        <p14:creationId xmlns="" xmlns:a="http://schemas.openxmlformats.org/drawingml/2006/main" xmlns:r="http://schemas.openxmlformats.org/officeDocument/2006/relationships" xmlns:p="http://schemas.openxmlformats.org/presentationml/2006/main" xmlns:p14="http://schemas.microsoft.com/office/powerpoint/2010/main" xmlns:mv="urn:schemas-microsoft-com:mac:vml" xmlns:mc="http://schemas.openxmlformats.org/markup-compatibility/2006" val="1926353899"/>
+        <p14:creationId xmlns:p14="http://schemas.microsoft.com/office/powerpoint/2010/main" val="1926353899"/>
       </p:ext>
     </p:extLst>
   </p:cSld>
@@ -8904,7 +8915,7 @@
 </file>
 
 <file path=ppt/slides/slide19.xml><?xml version="1.0" encoding="utf-8"?>
-<p:sld xmlns:a="http://schemas.openxmlformats.org/drawingml/2006/main" xmlns:r="http://schemas.openxmlformats.org/officeDocument/2006/relationships" xmlns:mc="http://schemas.openxmlformats.org/markup-compatibility/2006" xmlns:mv="urn:schemas-microsoft-com:mac:vml" xmlns:p="http://schemas.openxmlformats.org/presentationml/2006/main" mc:Ignorable="mv" mc:PreserveAttributes="mv:*">
+<p:sld xmlns:a="http://schemas.openxmlformats.org/drawingml/2006/main" xmlns:r="http://schemas.openxmlformats.org/officeDocument/2006/relationships" xmlns:p="http://schemas.openxmlformats.org/presentationml/2006/main">
   <p:cSld>
     <p:spTree>
       <p:nvGrpSpPr>
@@ -9007,7 +9018,7 @@
     </p:spTree>
     <p:extLst>
       <p:ext uri="{BB962C8B-B14F-4D97-AF65-F5344CB8AC3E}">
-        <p14:creationId xmlns="" xmlns:a="http://schemas.openxmlformats.org/drawingml/2006/main" xmlns:r="http://schemas.openxmlformats.org/officeDocument/2006/relationships" xmlns:p="http://schemas.openxmlformats.org/presentationml/2006/main" xmlns:p14="http://schemas.microsoft.com/office/powerpoint/2010/main" xmlns:mv="urn:schemas-microsoft-com:mac:vml" xmlns:mc="http://schemas.openxmlformats.org/markup-compatibility/2006" val="2664379960"/>
+        <p14:creationId xmlns:p14="http://schemas.microsoft.com/office/powerpoint/2010/main" val="2664379960"/>
       </p:ext>
     </p:extLst>
   </p:cSld>
@@ -9025,7 +9036,7 @@
 </file>
 
 <file path=ppt/slides/slide2.xml><?xml version="1.0" encoding="utf-8"?>
-<p:sld xmlns:a="http://schemas.openxmlformats.org/drawingml/2006/main" xmlns:r="http://schemas.openxmlformats.org/officeDocument/2006/relationships" xmlns:mc="http://schemas.openxmlformats.org/markup-compatibility/2006" xmlns:mv="urn:schemas-microsoft-com:mac:vml" xmlns:p="http://schemas.openxmlformats.org/presentationml/2006/main" mc:Ignorable="mv" mc:PreserveAttributes="mv:*">
+<p:sld xmlns:a="http://schemas.openxmlformats.org/drawingml/2006/main" xmlns:r="http://schemas.openxmlformats.org/officeDocument/2006/relationships" xmlns:p="http://schemas.openxmlformats.org/presentationml/2006/main">
   <p:cSld>
     <p:spTree>
       <p:nvGrpSpPr>
@@ -9321,7 +9332,7 @@
 </file>
 
 <file path=ppt/slides/slide20.xml><?xml version="1.0" encoding="utf-8"?>
-<p:sld xmlns:a="http://schemas.openxmlformats.org/drawingml/2006/main" xmlns:r="http://schemas.openxmlformats.org/officeDocument/2006/relationships" xmlns:mc="http://schemas.openxmlformats.org/markup-compatibility/2006" xmlns:mv="urn:schemas-microsoft-com:mac:vml" xmlns:p="http://schemas.openxmlformats.org/presentationml/2006/main" mc:Ignorable="mv" mc:PreserveAttributes="mv:*">
+<p:sld xmlns:a="http://schemas.openxmlformats.org/drawingml/2006/main" xmlns:r="http://schemas.openxmlformats.org/officeDocument/2006/relationships" xmlns:p="http://schemas.openxmlformats.org/presentationml/2006/main">
   <p:cSld>
     <p:spTree>
       <p:nvGrpSpPr>
@@ -9445,7 +9456,7 @@
 </file>
 
 <file path=ppt/slides/slide21.xml><?xml version="1.0" encoding="utf-8"?>
-<p:sld xmlns:a="http://schemas.openxmlformats.org/drawingml/2006/main" xmlns:r="http://schemas.openxmlformats.org/officeDocument/2006/relationships" xmlns:mc="http://schemas.openxmlformats.org/markup-compatibility/2006" xmlns:mv="urn:schemas-microsoft-com:mac:vml" xmlns:p="http://schemas.openxmlformats.org/presentationml/2006/main" mc:Ignorable="mv" mc:PreserveAttributes="mv:*">
+<p:sld xmlns:a="http://schemas.openxmlformats.org/drawingml/2006/main" xmlns:r="http://schemas.openxmlformats.org/officeDocument/2006/relationships" xmlns:p="http://schemas.openxmlformats.org/presentationml/2006/main">
   <p:cSld>
     <p:spTree>
       <p:nvGrpSpPr>
@@ -9585,7 +9596,7 @@
 </file>
 
 <file path=ppt/slides/slide22.xml><?xml version="1.0" encoding="utf-8"?>
-<p:sld xmlns:a="http://schemas.openxmlformats.org/drawingml/2006/main" xmlns:r="http://schemas.openxmlformats.org/officeDocument/2006/relationships" xmlns:mc="http://schemas.openxmlformats.org/markup-compatibility/2006" xmlns:mv="urn:schemas-microsoft-com:mac:vml" xmlns:p="http://schemas.openxmlformats.org/presentationml/2006/main" mc:Ignorable="mv" mc:PreserveAttributes="mv:*">
+<p:sld xmlns:a="http://schemas.openxmlformats.org/drawingml/2006/main" xmlns:r="http://schemas.openxmlformats.org/officeDocument/2006/relationships" xmlns:p="http://schemas.openxmlformats.org/presentationml/2006/main">
   <p:cSld>
     <p:spTree>
       <p:nvGrpSpPr>
@@ -9972,7 +9983,7 @@
 </file>
 
 <file path=ppt/slides/slide23.xml><?xml version="1.0" encoding="utf-8"?>
-<p:sld xmlns:a="http://schemas.openxmlformats.org/drawingml/2006/main" xmlns:r="http://schemas.openxmlformats.org/officeDocument/2006/relationships" xmlns:mc="http://schemas.openxmlformats.org/markup-compatibility/2006" xmlns:mv="urn:schemas-microsoft-com:mac:vml" xmlns:p="http://schemas.openxmlformats.org/presentationml/2006/main" mc:Ignorable="mv" mc:PreserveAttributes="mv:*">
+<p:sld xmlns:a="http://schemas.openxmlformats.org/drawingml/2006/main" xmlns:r="http://schemas.openxmlformats.org/officeDocument/2006/relationships" xmlns:p="http://schemas.openxmlformats.org/presentationml/2006/main">
   <p:cSld>
     <p:spTree>
       <p:nvGrpSpPr>
@@ -10067,7 +10078,7 @@
 </file>
 
 <file path=ppt/slides/slide3.xml><?xml version="1.0" encoding="utf-8"?>
-<p:sld xmlns:a="http://schemas.openxmlformats.org/drawingml/2006/main" xmlns:r="http://schemas.openxmlformats.org/officeDocument/2006/relationships" xmlns:mc="http://schemas.openxmlformats.org/markup-compatibility/2006" xmlns:mv="urn:schemas-microsoft-com:mac:vml" xmlns:p="http://schemas.openxmlformats.org/presentationml/2006/main" mc:Ignorable="mv" mc:PreserveAttributes="mv:*">
+<p:sld xmlns:a="http://schemas.openxmlformats.org/drawingml/2006/main" xmlns:r="http://schemas.openxmlformats.org/officeDocument/2006/relationships" xmlns:p="http://schemas.openxmlformats.org/presentationml/2006/main">
   <p:cSld>
     <p:spTree>
       <p:nvGrpSpPr>
@@ -10334,7 +10345,7 @@
 </file>
 
 <file path=ppt/slides/slide4.xml><?xml version="1.0" encoding="utf-8"?>
-<p:sld xmlns:a="http://schemas.openxmlformats.org/drawingml/2006/main" xmlns:r="http://schemas.openxmlformats.org/officeDocument/2006/relationships" xmlns:mc="http://schemas.openxmlformats.org/markup-compatibility/2006" xmlns:mv="urn:schemas-microsoft-com:mac:vml" xmlns:p="http://schemas.openxmlformats.org/presentationml/2006/main" mc:Ignorable="mv" mc:PreserveAttributes="mv:*">
+<p:sld xmlns:a="http://schemas.openxmlformats.org/drawingml/2006/main" xmlns:r="http://schemas.openxmlformats.org/officeDocument/2006/relationships" xmlns:p="http://schemas.openxmlformats.org/presentationml/2006/main">
   <p:cSld>
     <p:spTree>
       <p:nvGrpSpPr>
@@ -10927,7 +10938,7 @@
                             </p:stCondLst>
                             <p:childTnLst>
                               <p:par>
-                                <p:cTn id="9" presetID="21" presetClass="entr" presetSubtype="1" fill="hold" grpId="0" nodeType="clickEffect">
+                                <p:cTn id="9" presetID="1" presetClass="entr" presetSubtype="0" fill="hold" grpId="0" nodeType="clickEffect">
                                   <p:stCondLst>
                                     <p:cond delay="0"/>
                                   </p:stCondLst>
@@ -10950,14 +10961,6 @@
                                         <p:strVal val="visible"/>
                                       </p:to>
                                     </p:set>
-                                    <p:animEffect transition="in" filter="wheel(1)">
-                                      <p:cBhvr>
-                                        <p:cTn id="11" dur="2000"/>
-                                        <p:tgtEl>
-                                          <p:spTgt spid="271"/>
-                                        </p:tgtEl>
-                                      </p:cBhvr>
-                                    </p:animEffect>
                                   </p:childTnLst>
                                 </p:cTn>
                               </p:par>
@@ -10968,26 +10971,26 @@
                     </p:cTn>
                   </p:par>
                   <p:par>
-                    <p:cTn id="12" fill="hold">
+                    <p:cTn id="11" fill="hold">
                       <p:stCondLst>
                         <p:cond delay="indefinite"/>
                       </p:stCondLst>
                       <p:childTnLst>
                         <p:par>
-                          <p:cTn id="13" fill="hold">
+                          <p:cTn id="12" fill="hold">
                             <p:stCondLst>
                               <p:cond delay="0"/>
                             </p:stCondLst>
                             <p:childTnLst>
                               <p:par>
-                                <p:cTn id="14" presetID="31" presetClass="entr" presetSubtype="0" fill="hold" grpId="0" nodeType="clickEffect">
+                                <p:cTn id="13" presetID="1" presetClass="entr" presetSubtype="0" fill="hold" grpId="0" nodeType="clickEffect">
                                   <p:stCondLst>
                                     <p:cond delay="0"/>
                                   </p:stCondLst>
                                   <p:childTnLst>
                                     <p:set>
                                       <p:cBhvr>
-                                        <p:cTn id="15" dur="1" fill="hold">
+                                        <p:cTn id="14" dur="1" fill="hold">
                                           <p:stCondLst>
                                             <p:cond delay="0"/>
                                           </p:stCondLst>
@@ -11003,83 +11006,6 @@
                                         <p:strVal val="visible"/>
                                       </p:to>
                                     </p:set>
-                                    <p:anim calcmode="lin" valueType="num">
-                                      <p:cBhvr>
-                                        <p:cTn id="16" dur="1000" fill="hold"/>
-                                        <p:tgtEl>
-                                          <p:spTgt spid="270"/>
-                                        </p:tgtEl>
-                                        <p:attrNameLst>
-                                          <p:attrName>ppt_w</p:attrName>
-                                        </p:attrNameLst>
-                                      </p:cBhvr>
-                                      <p:tavLst>
-                                        <p:tav tm="0">
-                                          <p:val>
-                                            <p:fltVal val="0"/>
-                                          </p:val>
-                                        </p:tav>
-                                        <p:tav tm="100000">
-                                          <p:val>
-                                            <p:strVal val="#ppt_w"/>
-                                          </p:val>
-                                        </p:tav>
-                                      </p:tavLst>
-                                    </p:anim>
-                                    <p:anim calcmode="lin" valueType="num">
-                                      <p:cBhvr>
-                                        <p:cTn id="17" dur="1000" fill="hold"/>
-                                        <p:tgtEl>
-                                          <p:spTgt spid="270"/>
-                                        </p:tgtEl>
-                                        <p:attrNameLst>
-                                          <p:attrName>ppt_h</p:attrName>
-                                        </p:attrNameLst>
-                                      </p:cBhvr>
-                                      <p:tavLst>
-                                        <p:tav tm="0">
-                                          <p:val>
-                                            <p:fltVal val="0"/>
-                                          </p:val>
-                                        </p:tav>
-                                        <p:tav tm="100000">
-                                          <p:val>
-                                            <p:strVal val="#ppt_h"/>
-                                          </p:val>
-                                        </p:tav>
-                                      </p:tavLst>
-                                    </p:anim>
-                                    <p:anim calcmode="lin" valueType="num">
-                                      <p:cBhvr>
-                                        <p:cTn id="18" dur="1000" fill="hold"/>
-                                        <p:tgtEl>
-                                          <p:spTgt spid="270"/>
-                                        </p:tgtEl>
-                                        <p:attrNameLst>
-                                          <p:attrName>style.rotation</p:attrName>
-                                        </p:attrNameLst>
-                                      </p:cBhvr>
-                                      <p:tavLst>
-                                        <p:tav tm="0">
-                                          <p:val>
-                                            <p:fltVal val="90"/>
-                                          </p:val>
-                                        </p:tav>
-                                        <p:tav tm="100000">
-                                          <p:val>
-                                            <p:fltVal val="0"/>
-                                          </p:val>
-                                        </p:tav>
-                                      </p:tavLst>
-                                    </p:anim>
-                                    <p:animEffect transition="in" filter="fade">
-                                      <p:cBhvr>
-                                        <p:cTn id="19" dur="1000"/>
-                                        <p:tgtEl>
-                                          <p:spTgt spid="270"/>
-                                        </p:tgtEl>
-                                      </p:cBhvr>
-                                    </p:animEffect>
                                   </p:childTnLst>
                                 </p:cTn>
                               </p:par>
@@ -11090,26 +11016,26 @@
                     </p:cTn>
                   </p:par>
                   <p:par>
-                    <p:cTn id="20" fill="hold">
+                    <p:cTn id="15" fill="hold">
                       <p:stCondLst>
                         <p:cond delay="indefinite"/>
                       </p:stCondLst>
                       <p:childTnLst>
                         <p:par>
-                          <p:cTn id="21" fill="hold">
+                          <p:cTn id="16" fill="hold">
                             <p:stCondLst>
                               <p:cond delay="0"/>
                             </p:stCondLst>
                             <p:childTnLst>
                               <p:par>
-                                <p:cTn id="22" presetID="2" presetClass="entr" presetSubtype="4" fill="hold" nodeType="clickEffect">
+                                <p:cTn id="17" presetID="1" presetClass="entr" presetSubtype="0" fill="hold" nodeType="clickEffect">
                                   <p:stCondLst>
                                     <p:cond delay="0"/>
                                   </p:stCondLst>
                                   <p:childTnLst>
                                     <p:set>
                                       <p:cBhvr>
-                                        <p:cTn id="23" dur="1" fill="hold">
+                                        <p:cTn id="18" dur="1" fill="hold">
                                           <p:stCondLst>
                                             <p:cond delay="0"/>
                                           </p:stCondLst>
@@ -11125,52 +11051,6 @@
                                         <p:strVal val="visible"/>
                                       </p:to>
                                     </p:set>
-                                    <p:anim calcmode="lin" valueType="num">
-                                      <p:cBhvr additive="base">
-                                        <p:cTn id="24" dur="500" fill="hold"/>
-                                        <p:tgtEl>
-                                          <p:spTgt spid="278"/>
-                                        </p:tgtEl>
-                                        <p:attrNameLst>
-                                          <p:attrName>ppt_x</p:attrName>
-                                        </p:attrNameLst>
-                                      </p:cBhvr>
-                                      <p:tavLst>
-                                        <p:tav tm="0">
-                                          <p:val>
-                                            <p:strVal val="#ppt_x"/>
-                                          </p:val>
-                                        </p:tav>
-                                        <p:tav tm="100000">
-                                          <p:val>
-                                            <p:strVal val="#ppt_x"/>
-                                          </p:val>
-                                        </p:tav>
-                                      </p:tavLst>
-                                    </p:anim>
-                                    <p:anim calcmode="lin" valueType="num">
-                                      <p:cBhvr additive="base">
-                                        <p:cTn id="25" dur="500" fill="hold"/>
-                                        <p:tgtEl>
-                                          <p:spTgt spid="278"/>
-                                        </p:tgtEl>
-                                        <p:attrNameLst>
-                                          <p:attrName>ppt_y</p:attrName>
-                                        </p:attrNameLst>
-                                      </p:cBhvr>
-                                      <p:tavLst>
-                                        <p:tav tm="0">
-                                          <p:val>
-                                            <p:strVal val="1+#ppt_h/2"/>
-                                          </p:val>
-                                        </p:tav>
-                                        <p:tav tm="100000">
-                                          <p:val>
-                                            <p:strVal val="#ppt_y"/>
-                                          </p:val>
-                                        </p:tav>
-                                      </p:tavLst>
-                                    </p:anim>
                                   </p:childTnLst>
                                 </p:cTn>
                               </p:par>
@@ -11178,20 +11058,20 @@
                           </p:cTn>
                         </p:par>
                         <p:par>
-                          <p:cTn id="26" fill="hold">
+                          <p:cTn id="19" fill="hold">
                             <p:stCondLst>
-                              <p:cond delay="500"/>
+                              <p:cond delay="0"/>
                             </p:stCondLst>
                             <p:childTnLst>
                               <p:par>
-                                <p:cTn id="27" presetID="2" presetClass="entr" presetSubtype="4" fill="hold" nodeType="afterEffect">
+                                <p:cTn id="20" presetID="1" presetClass="entr" presetSubtype="0" fill="hold" nodeType="afterEffect">
                                   <p:stCondLst>
                                     <p:cond delay="0"/>
                                   </p:stCondLst>
                                   <p:childTnLst>
                                     <p:set>
                                       <p:cBhvr>
-                                        <p:cTn id="28" dur="1" fill="hold">
+                                        <p:cTn id="21" dur="1" fill="hold">
                                           <p:stCondLst>
                                             <p:cond delay="0"/>
                                           </p:stCondLst>
@@ -11207,52 +11087,6 @@
                                         <p:strVal val="visible"/>
                                       </p:to>
                                     </p:set>
-                                    <p:anim calcmode="lin" valueType="num">
-                                      <p:cBhvr additive="base">
-                                        <p:cTn id="29" dur="500" fill="hold"/>
-                                        <p:tgtEl>
-                                          <p:spTgt spid="279"/>
-                                        </p:tgtEl>
-                                        <p:attrNameLst>
-                                          <p:attrName>ppt_x</p:attrName>
-                                        </p:attrNameLst>
-                                      </p:cBhvr>
-                                      <p:tavLst>
-                                        <p:tav tm="0">
-                                          <p:val>
-                                            <p:strVal val="#ppt_x"/>
-                                          </p:val>
-                                        </p:tav>
-                                        <p:tav tm="100000">
-                                          <p:val>
-                                            <p:strVal val="#ppt_x"/>
-                                          </p:val>
-                                        </p:tav>
-                                      </p:tavLst>
-                                    </p:anim>
-                                    <p:anim calcmode="lin" valueType="num">
-                                      <p:cBhvr additive="base">
-                                        <p:cTn id="30" dur="500" fill="hold"/>
-                                        <p:tgtEl>
-                                          <p:spTgt spid="279"/>
-                                        </p:tgtEl>
-                                        <p:attrNameLst>
-                                          <p:attrName>ppt_y</p:attrName>
-                                        </p:attrNameLst>
-                                      </p:cBhvr>
-                                      <p:tavLst>
-                                        <p:tav tm="0">
-                                          <p:val>
-                                            <p:strVal val="1+#ppt_h/2"/>
-                                          </p:val>
-                                        </p:tav>
-                                        <p:tav tm="100000">
-                                          <p:val>
-                                            <p:strVal val="#ppt_y"/>
-                                          </p:val>
-                                        </p:tav>
-                                      </p:tavLst>
-                                    </p:anim>
                                   </p:childTnLst>
                                 </p:cTn>
                               </p:par>
@@ -11263,26 +11097,26 @@
                     </p:cTn>
                   </p:par>
                   <p:par>
-                    <p:cTn id="31" fill="hold">
+                    <p:cTn id="22" fill="hold">
                       <p:stCondLst>
                         <p:cond delay="indefinite"/>
                       </p:stCondLst>
                       <p:childTnLst>
                         <p:par>
-                          <p:cTn id="32" fill="hold">
+                          <p:cTn id="23" fill="hold">
                             <p:stCondLst>
                               <p:cond delay="0"/>
                             </p:stCondLst>
                             <p:childTnLst>
                               <p:par>
-                                <p:cTn id="33" presetID="14" presetClass="entr" presetSubtype="10" fill="hold" grpId="0" nodeType="clickEffect">
+                                <p:cTn id="24" presetID="1" presetClass="entr" presetSubtype="0" fill="hold" grpId="0" nodeType="clickEffect">
                                   <p:stCondLst>
                                     <p:cond delay="0"/>
                                   </p:stCondLst>
                                   <p:childTnLst>
                                     <p:set>
                                       <p:cBhvr>
-                                        <p:cTn id="34" dur="1" fill="hold">
+                                        <p:cTn id="25" dur="1" fill="hold">
                                           <p:stCondLst>
                                             <p:cond delay="0"/>
                                           </p:stCondLst>
@@ -11298,14 +11132,6 @@
                                         <p:strVal val="visible"/>
                                       </p:to>
                                     </p:set>
-                                    <p:animEffect transition="in" filter="randombar(horizontal)">
-                                      <p:cBhvr>
-                                        <p:cTn id="35" dur="500"/>
-                                        <p:tgtEl>
-                                          <p:spTgt spid="274"/>
-                                        </p:tgtEl>
-                                      </p:cBhvr>
-                                    </p:animEffect>
                                   </p:childTnLst>
                                 </p:cTn>
                               </p:par>
@@ -11316,26 +11142,26 @@
                     </p:cTn>
                   </p:par>
                   <p:par>
-                    <p:cTn id="36" fill="hold">
+                    <p:cTn id="26" fill="hold">
                       <p:stCondLst>
                         <p:cond delay="indefinite"/>
                       </p:stCondLst>
                       <p:childTnLst>
                         <p:par>
-                          <p:cTn id="37" fill="hold">
+                          <p:cTn id="27" fill="hold">
                             <p:stCondLst>
                               <p:cond delay="0"/>
                             </p:stCondLst>
                             <p:childTnLst>
                               <p:par>
-                                <p:cTn id="38" presetID="45" presetClass="entr" presetSubtype="0" fill="hold" grpId="0" nodeType="clickEffect">
+                                <p:cTn id="28" presetID="1" presetClass="entr" presetSubtype="0" fill="hold" grpId="0" nodeType="clickEffect">
                                   <p:stCondLst>
                                     <p:cond delay="0"/>
                                   </p:stCondLst>
                                   <p:childTnLst>
                                     <p:set>
                                       <p:cBhvr>
-                                        <p:cTn id="39" dur="1" fill="hold">
+                                        <p:cTn id="29" dur="1" fill="hold">
                                           <p:stCondLst>
                                             <p:cond delay="0"/>
                                           </p:stCondLst>
@@ -11351,60 +11177,6 @@
                                         <p:strVal val="visible"/>
                                       </p:to>
                                     </p:set>
-                                    <p:animEffect transition="in" filter="fade">
-                                      <p:cBhvr>
-                                        <p:cTn id="40" dur="2000"/>
-                                        <p:tgtEl>
-                                          <p:spTgt spid="272"/>
-                                        </p:tgtEl>
-                                      </p:cBhvr>
-                                    </p:animEffect>
-                                    <p:anim calcmode="lin" valueType="num">
-                                      <p:cBhvr>
-                                        <p:cTn id="41" dur="2000" fill="hold"/>
-                                        <p:tgtEl>
-                                          <p:spTgt spid="272"/>
-                                        </p:tgtEl>
-                                        <p:attrNameLst>
-                                          <p:attrName>ppt_w</p:attrName>
-                                        </p:attrNameLst>
-                                      </p:cBhvr>
-                                      <p:tavLst>
-                                        <p:tav tm="0" fmla="#ppt_w*sin(2.5*pi*$)">
-                                          <p:val>
-                                            <p:fltVal val="0"/>
-                                          </p:val>
-                                        </p:tav>
-                                        <p:tav tm="100000">
-                                          <p:val>
-                                            <p:fltVal val="1"/>
-                                          </p:val>
-                                        </p:tav>
-                                      </p:tavLst>
-                                    </p:anim>
-                                    <p:anim calcmode="lin" valueType="num">
-                                      <p:cBhvr>
-                                        <p:cTn id="42" dur="2000" fill="hold"/>
-                                        <p:tgtEl>
-                                          <p:spTgt spid="272"/>
-                                        </p:tgtEl>
-                                        <p:attrNameLst>
-                                          <p:attrName>ppt_h</p:attrName>
-                                        </p:attrNameLst>
-                                      </p:cBhvr>
-                                      <p:tavLst>
-                                        <p:tav tm="0">
-                                          <p:val>
-                                            <p:strVal val="#ppt_h"/>
-                                          </p:val>
-                                        </p:tav>
-                                        <p:tav tm="100000">
-                                          <p:val>
-                                            <p:strVal val="#ppt_h"/>
-                                          </p:val>
-                                        </p:tav>
-                                      </p:tavLst>
-                                    </p:anim>
                                   </p:childTnLst>
                                 </p:cTn>
                               </p:par>
@@ -11415,26 +11187,26 @@
                     </p:cTn>
                   </p:par>
                   <p:par>
-                    <p:cTn id="43" fill="hold">
+                    <p:cTn id="30" fill="hold">
                       <p:stCondLst>
                         <p:cond delay="indefinite"/>
                       </p:stCondLst>
                       <p:childTnLst>
                         <p:par>
-                          <p:cTn id="44" fill="hold">
+                          <p:cTn id="31" fill="hold">
                             <p:stCondLst>
                               <p:cond delay="0"/>
                             </p:stCondLst>
                             <p:childTnLst>
                               <p:par>
-                                <p:cTn id="45" presetID="2" presetClass="entr" presetSubtype="4" fill="hold" nodeType="clickEffect">
+                                <p:cTn id="32" presetID="1" presetClass="entr" presetSubtype="0" fill="hold" nodeType="clickEffect">
                                   <p:stCondLst>
                                     <p:cond delay="0"/>
                                   </p:stCondLst>
                                   <p:childTnLst>
                                     <p:set>
                                       <p:cBhvr>
-                                        <p:cTn id="46" dur="1" fill="hold">
+                                        <p:cTn id="33" dur="1" fill="hold">
                                           <p:stCondLst>
                                             <p:cond delay="0"/>
                                           </p:stCondLst>
@@ -11450,52 +11222,6 @@
                                         <p:strVal val="visible"/>
                                       </p:to>
                                     </p:set>
-                                    <p:anim calcmode="lin" valueType="num">
-                                      <p:cBhvr additive="base">
-                                        <p:cTn id="47" dur="500" fill="hold"/>
-                                        <p:tgtEl>
-                                          <p:spTgt spid="277"/>
-                                        </p:tgtEl>
-                                        <p:attrNameLst>
-                                          <p:attrName>ppt_x</p:attrName>
-                                        </p:attrNameLst>
-                                      </p:cBhvr>
-                                      <p:tavLst>
-                                        <p:tav tm="0">
-                                          <p:val>
-                                            <p:strVal val="#ppt_x"/>
-                                          </p:val>
-                                        </p:tav>
-                                        <p:tav tm="100000">
-                                          <p:val>
-                                            <p:strVal val="#ppt_x"/>
-                                          </p:val>
-                                        </p:tav>
-                                      </p:tavLst>
-                                    </p:anim>
-                                    <p:anim calcmode="lin" valueType="num">
-                                      <p:cBhvr additive="base">
-                                        <p:cTn id="48" dur="500" fill="hold"/>
-                                        <p:tgtEl>
-                                          <p:spTgt spid="277"/>
-                                        </p:tgtEl>
-                                        <p:attrNameLst>
-                                          <p:attrName>ppt_y</p:attrName>
-                                        </p:attrNameLst>
-                                      </p:cBhvr>
-                                      <p:tavLst>
-                                        <p:tav tm="0">
-                                          <p:val>
-                                            <p:strVal val="1+#ppt_h/2"/>
-                                          </p:val>
-                                        </p:tav>
-                                        <p:tav tm="100000">
-                                          <p:val>
-                                            <p:strVal val="#ppt_y"/>
-                                          </p:val>
-                                        </p:tav>
-                                      </p:tavLst>
-                                    </p:anim>
                                   </p:childTnLst>
                                 </p:cTn>
                               </p:par>
@@ -11506,26 +11232,26 @@
                     </p:cTn>
                   </p:par>
                   <p:par>
-                    <p:cTn id="49" fill="hold">
+                    <p:cTn id="34" fill="hold">
                       <p:stCondLst>
                         <p:cond delay="indefinite"/>
                       </p:stCondLst>
                       <p:childTnLst>
                         <p:par>
-                          <p:cTn id="50" fill="hold">
+                          <p:cTn id="35" fill="hold">
                             <p:stCondLst>
                               <p:cond delay="0"/>
                             </p:stCondLst>
                             <p:childTnLst>
                               <p:par>
-                                <p:cTn id="51" presetID="26" presetClass="entr" presetSubtype="0" fill="hold" grpId="0" nodeType="clickEffect">
+                                <p:cTn id="36" presetID="1" presetClass="entr" presetSubtype="0" fill="hold" grpId="0" nodeType="clickEffect">
                                   <p:stCondLst>
                                     <p:cond delay="0"/>
                                   </p:stCondLst>
                                   <p:childTnLst>
                                     <p:set>
                                       <p:cBhvr>
-                                        <p:cTn id="52" dur="1" fill="hold">
+                                        <p:cTn id="37" dur="1" fill="hold">
                                           <p:stCondLst>
                                             <p:cond delay="0"/>
                                           </p:stCondLst>
@@ -11541,257 +11267,6 @@
                                         <p:strVal val="visible"/>
                                       </p:to>
                                     </p:set>
-                                    <p:animEffect transition="in" filter="wipe(down)">
-                                      <p:cBhvr>
-                                        <p:cTn id="53" dur="145">
-                                          <p:stCondLst>
-                                            <p:cond delay="0"/>
-                                          </p:stCondLst>
-                                        </p:cTn>
-                                        <p:tgtEl>
-                                          <p:spTgt spid="276"/>
-                                        </p:tgtEl>
-                                      </p:cBhvr>
-                                    </p:animEffect>
-                                    <p:anim calcmode="lin" valueType="num">
-                                      <p:cBhvr>
-                                        <p:cTn id="54" dur="456" tmFilter="0,0; 0.14,0.36; 0.43,0.73; 0.71,0.91; 1.0,1.0">
-                                          <p:stCondLst>
-                                            <p:cond delay="0"/>
-                                          </p:stCondLst>
-                                        </p:cTn>
-                                        <p:tgtEl>
-                                          <p:spTgt spid="276"/>
-                                        </p:tgtEl>
-                                        <p:attrNameLst>
-                                          <p:attrName>ppt_x</p:attrName>
-                                        </p:attrNameLst>
-                                      </p:cBhvr>
-                                      <p:tavLst>
-                                        <p:tav tm="0">
-                                          <p:val>
-                                            <p:strVal val="#ppt_x-0.25"/>
-                                          </p:val>
-                                        </p:tav>
-                                        <p:tav tm="100000">
-                                          <p:val>
-                                            <p:strVal val="#ppt_x"/>
-                                          </p:val>
-                                        </p:tav>
-                                      </p:tavLst>
-                                    </p:anim>
-                                    <p:anim calcmode="lin" valueType="num">
-                                      <p:cBhvr>
-                                        <p:cTn id="55" dur="166" tmFilter="0.0,0.0; 0.25,0.07; 0.50,0.2; 0.75,0.467; 1.0,1.0">
-                                          <p:stCondLst>
-                                            <p:cond delay="0"/>
-                                          </p:stCondLst>
-                                        </p:cTn>
-                                        <p:tgtEl>
-                                          <p:spTgt spid="276"/>
-                                        </p:tgtEl>
-                                        <p:attrNameLst>
-                                          <p:attrName>ppt_y</p:attrName>
-                                        </p:attrNameLst>
-                                      </p:cBhvr>
-                                      <p:tavLst>
-                                        <p:tav tm="0" fmla="#ppt_y-sin(pi*$)/3">
-                                          <p:val>
-                                            <p:fltVal val="0.5"/>
-                                          </p:val>
-                                        </p:tav>
-                                        <p:tav tm="100000">
-                                          <p:val>
-                                            <p:fltVal val="1"/>
-                                          </p:val>
-                                        </p:tav>
-                                      </p:tavLst>
-                                    </p:anim>
-                                    <p:anim calcmode="lin" valueType="num">
-                                      <p:cBhvr>
-                                        <p:cTn id="56" dur="166" tmFilter="0, 0; 0.125,0.2665; 0.25,0.4; 0.375,0.465; 0.5,0.5;  0.625,0.535; 0.75,0.6; 0.875,0.7335; 1,1">
-                                          <p:stCondLst>
-                                            <p:cond delay="166"/>
-                                          </p:stCondLst>
-                                        </p:cTn>
-                                        <p:tgtEl>
-                                          <p:spTgt spid="276"/>
-                                        </p:tgtEl>
-                                        <p:attrNameLst>
-                                          <p:attrName>ppt_y</p:attrName>
-                                        </p:attrNameLst>
-                                      </p:cBhvr>
-                                      <p:tavLst>
-                                        <p:tav tm="0" fmla="#ppt_y-sin(pi*$)/9">
-                                          <p:val>
-                                            <p:fltVal val="0"/>
-                                          </p:val>
-                                        </p:tav>
-                                        <p:tav tm="100000">
-                                          <p:val>
-                                            <p:fltVal val="1"/>
-                                          </p:val>
-                                        </p:tav>
-                                      </p:tavLst>
-                                    </p:anim>
-                                    <p:anim calcmode="lin" valueType="num">
-                                      <p:cBhvr>
-                                        <p:cTn id="57" dur="83" tmFilter="0, 0; 0.125,0.2665; 0.25,0.4; 0.375,0.465; 0.5,0.5;  0.625,0.535; 0.75,0.6; 0.875,0.7335; 1,1">
-                                          <p:stCondLst>
-                                            <p:cond delay="331"/>
-                                          </p:stCondLst>
-                                        </p:cTn>
-                                        <p:tgtEl>
-                                          <p:spTgt spid="276"/>
-                                        </p:tgtEl>
-                                        <p:attrNameLst>
-                                          <p:attrName>ppt_y</p:attrName>
-                                        </p:attrNameLst>
-                                      </p:cBhvr>
-                                      <p:tavLst>
-                                        <p:tav tm="0" fmla="#ppt_y-sin(pi*$)/27">
-                                          <p:val>
-                                            <p:fltVal val="0"/>
-                                          </p:val>
-                                        </p:tav>
-                                        <p:tav tm="100000">
-                                          <p:val>
-                                            <p:fltVal val="1"/>
-                                          </p:val>
-                                        </p:tav>
-                                      </p:tavLst>
-                                    </p:anim>
-                                    <p:anim calcmode="lin" valueType="num">
-                                      <p:cBhvr>
-                                        <p:cTn id="58" dur="41" tmFilter="0, 0; 0.125,0.2665; 0.25,0.4; 0.375,0.465; 0.5,0.5;  0.625,0.535; 0.75,0.6; 0.875,0.7335; 1,1">
-                                          <p:stCondLst>
-                                            <p:cond delay="414"/>
-                                          </p:stCondLst>
-                                        </p:cTn>
-                                        <p:tgtEl>
-                                          <p:spTgt spid="276"/>
-                                        </p:tgtEl>
-                                        <p:attrNameLst>
-                                          <p:attrName>ppt_y</p:attrName>
-                                        </p:attrNameLst>
-                                      </p:cBhvr>
-                                      <p:tavLst>
-                                        <p:tav tm="0" fmla="#ppt_y-sin(pi*$)/81">
-                                          <p:val>
-                                            <p:fltVal val="0"/>
-                                          </p:val>
-                                        </p:tav>
-                                        <p:tav tm="100000">
-                                          <p:val>
-                                            <p:fltVal val="1"/>
-                                          </p:val>
-                                        </p:tav>
-                                      </p:tavLst>
-                                    </p:anim>
-                                    <p:animScale>
-                                      <p:cBhvr>
-                                        <p:cTn id="59" dur="7">
-                                          <p:stCondLst>
-                                            <p:cond delay="163"/>
-                                          </p:stCondLst>
-                                        </p:cTn>
-                                        <p:tgtEl>
-                                          <p:spTgt spid="276"/>
-                                        </p:tgtEl>
-                                      </p:cBhvr>
-                                      <p:to x="100000" y="60000"/>
-                                    </p:animScale>
-                                    <p:animScale>
-                                      <p:cBhvr>
-                                        <p:cTn id="60" dur="42" decel="50000">
-                                          <p:stCondLst>
-                                            <p:cond delay="169"/>
-                                          </p:stCondLst>
-                                        </p:cTn>
-                                        <p:tgtEl>
-                                          <p:spTgt spid="276"/>
-                                        </p:tgtEl>
-                                      </p:cBhvr>
-                                      <p:to x="100000" y="100000"/>
-                                    </p:animScale>
-                                    <p:animScale>
-                                      <p:cBhvr>
-                                        <p:cTn id="61" dur="7">
-                                          <p:stCondLst>
-                                            <p:cond delay="328"/>
-                                          </p:stCondLst>
-                                        </p:cTn>
-                                        <p:tgtEl>
-                                          <p:spTgt spid="276"/>
-                                        </p:tgtEl>
-                                      </p:cBhvr>
-                                      <p:to x="100000" y="80000"/>
-                                    </p:animScale>
-                                    <p:animScale>
-                                      <p:cBhvr>
-                                        <p:cTn id="62" dur="42" decel="50000">
-                                          <p:stCondLst>
-                                            <p:cond delay="335"/>
-                                          </p:stCondLst>
-                                        </p:cTn>
-                                        <p:tgtEl>
-                                          <p:spTgt spid="276"/>
-                                        </p:tgtEl>
-                                      </p:cBhvr>
-                                      <p:to x="100000" y="100000"/>
-                                    </p:animScale>
-                                    <p:animScale>
-                                      <p:cBhvr>
-                                        <p:cTn id="63" dur="7">
-                                          <p:stCondLst>
-                                            <p:cond delay="411"/>
-                                          </p:stCondLst>
-                                        </p:cTn>
-                                        <p:tgtEl>
-                                          <p:spTgt spid="276"/>
-                                        </p:tgtEl>
-                                      </p:cBhvr>
-                                      <p:to x="100000" y="90000"/>
-                                    </p:animScale>
-                                    <p:animScale>
-                                      <p:cBhvr>
-                                        <p:cTn id="64" dur="42" decel="50000">
-                                          <p:stCondLst>
-                                            <p:cond delay="417"/>
-                                          </p:stCondLst>
-                                        </p:cTn>
-                                        <p:tgtEl>
-                                          <p:spTgt spid="276"/>
-                                        </p:tgtEl>
-                                      </p:cBhvr>
-                                      <p:to x="100000" y="100000"/>
-                                    </p:animScale>
-                                    <p:animScale>
-                                      <p:cBhvr>
-                                        <p:cTn id="65" dur="7">
-                                          <p:stCondLst>
-                                            <p:cond delay="452"/>
-                                          </p:stCondLst>
-                                        </p:cTn>
-                                        <p:tgtEl>
-                                          <p:spTgt spid="276"/>
-                                        </p:tgtEl>
-                                      </p:cBhvr>
-                                      <p:to x="100000" y="95000"/>
-                                    </p:animScale>
-                                    <p:animScale>
-                                      <p:cBhvr>
-                                        <p:cTn id="66" dur="42" decel="50000">
-                                          <p:stCondLst>
-                                            <p:cond delay="459"/>
-                                          </p:stCondLst>
-                                        </p:cTn>
-                                        <p:tgtEl>
-                                          <p:spTgt spid="276"/>
-                                        </p:tgtEl>
-                                      </p:cBhvr>
-                                      <p:to x="100000" y="100000"/>
-                                    </p:animScale>
                                   </p:childTnLst>
                                 </p:cTn>
                               </p:par>
@@ -11802,26 +11277,26 @@
                     </p:cTn>
                   </p:par>
                   <p:par>
-                    <p:cTn id="67" fill="hold">
+                    <p:cTn id="38" fill="hold">
                       <p:stCondLst>
                         <p:cond delay="indefinite"/>
                       </p:stCondLst>
                       <p:childTnLst>
                         <p:par>
-                          <p:cTn id="68" fill="hold">
+                          <p:cTn id="39" fill="hold">
                             <p:stCondLst>
                               <p:cond delay="0"/>
                             </p:stCondLst>
                             <p:childTnLst>
                               <p:par>
-                                <p:cTn id="69" presetID="42" presetClass="entr" presetSubtype="0" fill="hold" nodeType="clickEffect">
+                                <p:cTn id="40" presetID="1" presetClass="entr" presetSubtype="0" fill="hold" nodeType="clickEffect">
                                   <p:stCondLst>
                                     <p:cond delay="0"/>
                                   </p:stCondLst>
                                   <p:childTnLst>
                                     <p:set>
                                       <p:cBhvr>
-                                        <p:cTn id="70" dur="1" fill="hold">
+                                        <p:cTn id="41" dur="1" fill="hold">
                                           <p:stCondLst>
                                             <p:cond delay="0"/>
                                           </p:stCondLst>
@@ -11837,60 +11312,6 @@
                                         <p:strVal val="visible"/>
                                       </p:to>
                                     </p:set>
-                                    <p:animEffect transition="in" filter="fade">
-                                      <p:cBhvr>
-                                        <p:cTn id="71" dur="1000"/>
-                                        <p:tgtEl>
-                                          <p:spTgt spid="273"/>
-                                        </p:tgtEl>
-                                      </p:cBhvr>
-                                    </p:animEffect>
-                                    <p:anim calcmode="lin" valueType="num">
-                                      <p:cBhvr>
-                                        <p:cTn id="72" dur="1000" fill="hold"/>
-                                        <p:tgtEl>
-                                          <p:spTgt spid="273"/>
-                                        </p:tgtEl>
-                                        <p:attrNameLst>
-                                          <p:attrName>ppt_x</p:attrName>
-                                        </p:attrNameLst>
-                                      </p:cBhvr>
-                                      <p:tavLst>
-                                        <p:tav tm="0">
-                                          <p:val>
-                                            <p:strVal val="#ppt_x"/>
-                                          </p:val>
-                                        </p:tav>
-                                        <p:tav tm="100000">
-                                          <p:val>
-                                            <p:strVal val="#ppt_x"/>
-                                          </p:val>
-                                        </p:tav>
-                                      </p:tavLst>
-                                    </p:anim>
-                                    <p:anim calcmode="lin" valueType="num">
-                                      <p:cBhvr>
-                                        <p:cTn id="73" dur="1000" fill="hold"/>
-                                        <p:tgtEl>
-                                          <p:spTgt spid="273"/>
-                                        </p:tgtEl>
-                                        <p:attrNameLst>
-                                          <p:attrName>ppt_y</p:attrName>
-                                        </p:attrNameLst>
-                                      </p:cBhvr>
-                                      <p:tavLst>
-                                        <p:tav tm="0">
-                                          <p:val>
-                                            <p:strVal val="#ppt_y+.1"/>
-                                          </p:val>
-                                        </p:tav>
-                                        <p:tav tm="100000">
-                                          <p:val>
-                                            <p:strVal val="#ppt_y"/>
-                                          </p:val>
-                                        </p:tav>
-                                      </p:tavLst>
-                                    </p:anim>
                                   </p:childTnLst>
                                 </p:cTn>
                               </p:par>
@@ -11901,26 +11322,26 @@
                     </p:cTn>
                   </p:par>
                   <p:par>
-                    <p:cTn id="74" fill="hold">
+                    <p:cTn id="42" fill="hold">
                       <p:stCondLst>
                         <p:cond delay="indefinite"/>
                       </p:stCondLst>
                       <p:childTnLst>
                         <p:par>
-                          <p:cTn id="75" fill="hold">
+                          <p:cTn id="43" fill="hold">
                             <p:stCondLst>
                               <p:cond delay="0"/>
                             </p:stCondLst>
                             <p:childTnLst>
                               <p:par>
-                                <p:cTn id="76" presetID="31" presetClass="entr" presetSubtype="0" fill="hold" grpId="0" nodeType="clickEffect">
+                                <p:cTn id="44" presetID="1" presetClass="entr" presetSubtype="0" fill="hold" grpId="0" nodeType="clickEffect">
                                   <p:stCondLst>
                                     <p:cond delay="0"/>
                                   </p:stCondLst>
                                   <p:childTnLst>
                                     <p:set>
                                       <p:cBhvr>
-                                        <p:cTn id="77" dur="1" fill="hold">
+                                        <p:cTn id="45" dur="1" fill="hold">
                                           <p:stCondLst>
                                             <p:cond delay="0"/>
                                           </p:stCondLst>
@@ -11936,83 +11357,6 @@
                                         <p:strVal val="visible"/>
                                       </p:to>
                                     </p:set>
-                                    <p:anim calcmode="lin" valueType="num">
-                                      <p:cBhvr>
-                                        <p:cTn id="78" dur="1000" fill="hold"/>
-                                        <p:tgtEl>
-                                          <p:spTgt spid="275"/>
-                                        </p:tgtEl>
-                                        <p:attrNameLst>
-                                          <p:attrName>ppt_w</p:attrName>
-                                        </p:attrNameLst>
-                                      </p:cBhvr>
-                                      <p:tavLst>
-                                        <p:tav tm="0">
-                                          <p:val>
-                                            <p:fltVal val="0"/>
-                                          </p:val>
-                                        </p:tav>
-                                        <p:tav tm="100000">
-                                          <p:val>
-                                            <p:strVal val="#ppt_w"/>
-                                          </p:val>
-                                        </p:tav>
-                                      </p:tavLst>
-                                    </p:anim>
-                                    <p:anim calcmode="lin" valueType="num">
-                                      <p:cBhvr>
-                                        <p:cTn id="79" dur="1000" fill="hold"/>
-                                        <p:tgtEl>
-                                          <p:spTgt spid="275"/>
-                                        </p:tgtEl>
-                                        <p:attrNameLst>
-                                          <p:attrName>ppt_h</p:attrName>
-                                        </p:attrNameLst>
-                                      </p:cBhvr>
-                                      <p:tavLst>
-                                        <p:tav tm="0">
-                                          <p:val>
-                                            <p:fltVal val="0"/>
-                                          </p:val>
-                                        </p:tav>
-                                        <p:tav tm="100000">
-                                          <p:val>
-                                            <p:strVal val="#ppt_h"/>
-                                          </p:val>
-                                        </p:tav>
-                                      </p:tavLst>
-                                    </p:anim>
-                                    <p:anim calcmode="lin" valueType="num">
-                                      <p:cBhvr>
-                                        <p:cTn id="80" dur="1000" fill="hold"/>
-                                        <p:tgtEl>
-                                          <p:spTgt spid="275"/>
-                                        </p:tgtEl>
-                                        <p:attrNameLst>
-                                          <p:attrName>style.rotation</p:attrName>
-                                        </p:attrNameLst>
-                                      </p:cBhvr>
-                                      <p:tavLst>
-                                        <p:tav tm="0">
-                                          <p:val>
-                                            <p:fltVal val="90"/>
-                                          </p:val>
-                                        </p:tav>
-                                        <p:tav tm="100000">
-                                          <p:val>
-                                            <p:fltVal val="0"/>
-                                          </p:val>
-                                        </p:tav>
-                                      </p:tavLst>
-                                    </p:anim>
-                                    <p:animEffect transition="in" filter="fade">
-                                      <p:cBhvr>
-                                        <p:cTn id="81" dur="1000"/>
-                                        <p:tgtEl>
-                                          <p:spTgt spid="275"/>
-                                        </p:tgtEl>
-                                      </p:cBhvr>
-                                    </p:animEffect>
                                   </p:childTnLst>
                                 </p:cTn>
                               </p:par>
@@ -12023,26 +11367,26 @@
                     </p:cTn>
                   </p:par>
                   <p:par>
-                    <p:cTn id="82" fill="hold">
+                    <p:cTn id="46" fill="hold">
                       <p:stCondLst>
                         <p:cond delay="indefinite"/>
                       </p:stCondLst>
                       <p:childTnLst>
                         <p:par>
-                          <p:cTn id="83" fill="hold">
+                          <p:cTn id="47" fill="hold">
                             <p:stCondLst>
                               <p:cond delay="0"/>
                             </p:stCondLst>
                             <p:childTnLst>
                               <p:par>
-                                <p:cTn id="84" presetID="1" presetClass="entr" presetSubtype="0" fill="hold" grpId="1" nodeType="clickEffect">
+                                <p:cTn id="48" presetID="1" presetClass="entr" presetSubtype="0" fill="hold" grpId="1" nodeType="clickEffect">
                                   <p:stCondLst>
                                     <p:cond delay="0"/>
                                   </p:stCondLst>
                                   <p:childTnLst>
                                     <p:set>
                                       <p:cBhvr>
-                                        <p:cTn id="85" dur="1" fill="hold">
+                                        <p:cTn id="49" dur="1" fill="hold">
                                           <p:stCondLst>
                                             <p:cond delay="0"/>
                                           </p:stCondLst>
@@ -12062,14 +11406,14 @@
                                 </p:cTn>
                               </p:par>
                               <p:par>
-                                <p:cTn id="86" presetID="1" presetClass="entr" presetSubtype="0" fill="hold" grpId="1" nodeType="withEffect">
+                                <p:cTn id="50" presetID="1" presetClass="entr" presetSubtype="0" fill="hold" grpId="1" nodeType="withEffect">
                                   <p:stCondLst>
                                     <p:cond delay="0"/>
                                   </p:stCondLst>
                                   <p:childTnLst>
                                     <p:set>
                                       <p:cBhvr>
-                                        <p:cTn id="87" dur="1" fill="hold">
+                                        <p:cTn id="51" dur="1" fill="hold">
                                           <p:stCondLst>
                                             <p:cond delay="0"/>
                                           </p:stCondLst>
@@ -12089,14 +11433,14 @@
                                 </p:cTn>
                               </p:par>
                               <p:par>
-                                <p:cTn id="88" presetID="1" presetClass="entr" presetSubtype="0" fill="hold" grpId="1" nodeType="withEffect">
+                                <p:cTn id="52" presetID="1" presetClass="entr" presetSubtype="0" fill="hold" grpId="1" nodeType="withEffect">
                                   <p:stCondLst>
                                     <p:cond delay="0"/>
                                   </p:stCondLst>
                                   <p:childTnLst>
                                     <p:set>
                                       <p:cBhvr>
-                                        <p:cTn id="89" dur="1" fill="hold">
+                                        <p:cTn id="53" dur="1" fill="hold">
                                           <p:stCondLst>
                                             <p:cond delay="0"/>
                                           </p:stCondLst>
@@ -12116,14 +11460,14 @@
                                 </p:cTn>
                               </p:par>
                               <p:par>
-                                <p:cTn id="90" presetID="1" presetClass="entr" presetSubtype="0" fill="hold" nodeType="withEffect">
+                                <p:cTn id="54" presetID="1" presetClass="entr" presetSubtype="0" fill="hold" nodeType="withEffect">
                                   <p:stCondLst>
                                     <p:cond delay="0"/>
                                   </p:stCondLst>
                                   <p:childTnLst>
                                     <p:set>
                                       <p:cBhvr>
-                                        <p:cTn id="91" dur="1" fill="hold">
+                                        <p:cTn id="55" dur="1" fill="hold">
                                           <p:stCondLst>
                                             <p:cond delay="0"/>
                                           </p:stCondLst>
@@ -12143,14 +11487,14 @@
                                 </p:cTn>
                               </p:par>
                               <p:par>
-                                <p:cTn id="92" presetID="1" presetClass="entr" presetSubtype="0" fill="hold" nodeType="withEffect">
+                                <p:cTn id="56" presetID="1" presetClass="entr" presetSubtype="0" fill="hold" nodeType="withEffect">
                                   <p:stCondLst>
                                     <p:cond delay="0"/>
                                   </p:stCondLst>
                                   <p:childTnLst>
                                     <p:set>
                                       <p:cBhvr>
-                                        <p:cTn id="93" dur="1" fill="hold">
+                                        <p:cTn id="57" dur="1" fill="hold">
                                           <p:stCondLst>
                                             <p:cond delay="0"/>
                                           </p:stCondLst>
@@ -12170,14 +11514,14 @@
                                 </p:cTn>
                               </p:par>
                               <p:par>
-                                <p:cTn id="94" presetID="1" presetClass="entr" presetSubtype="0" fill="hold" grpId="1" nodeType="withEffect">
+                                <p:cTn id="58" presetID="1" presetClass="entr" presetSubtype="0" fill="hold" grpId="1" nodeType="withEffect">
                                   <p:stCondLst>
                                     <p:cond delay="0"/>
                                   </p:stCondLst>
                                   <p:childTnLst>
                                     <p:set>
                                       <p:cBhvr>
-                                        <p:cTn id="95" dur="1" fill="hold">
+                                        <p:cTn id="59" dur="1" fill="hold">
                                           <p:stCondLst>
                                             <p:cond delay="0"/>
                                           </p:stCondLst>
@@ -12197,14 +11541,14 @@
                                 </p:cTn>
                               </p:par>
                               <p:par>
-                                <p:cTn id="96" presetID="1" presetClass="entr" presetSubtype="0" fill="hold" grpId="1" nodeType="withEffect">
+                                <p:cTn id="60" presetID="1" presetClass="entr" presetSubtype="0" fill="hold" grpId="1" nodeType="withEffect">
                                   <p:stCondLst>
                                     <p:cond delay="0"/>
                                   </p:stCondLst>
                                   <p:childTnLst>
                                     <p:set>
                                       <p:cBhvr>
-                                        <p:cTn id="97" dur="1" fill="hold">
+                                        <p:cTn id="61" dur="1" fill="hold">
                                           <p:stCondLst>
                                             <p:cond delay="0"/>
                                           </p:stCondLst>
@@ -12224,14 +11568,14 @@
                                 </p:cTn>
                               </p:par>
                               <p:par>
-                                <p:cTn id="98" presetID="1" presetClass="entr" presetSubtype="0" fill="hold" nodeType="withEffect">
+                                <p:cTn id="62" presetID="1" presetClass="entr" presetSubtype="0" fill="hold" nodeType="withEffect">
                                   <p:stCondLst>
                                     <p:cond delay="0"/>
                                   </p:stCondLst>
                                   <p:childTnLst>
                                     <p:set>
                                       <p:cBhvr>
-                                        <p:cTn id="99" dur="1" fill="hold">
+                                        <p:cTn id="63" dur="1" fill="hold">
                                           <p:stCondLst>
                                             <p:cond delay="0"/>
                                           </p:stCondLst>
@@ -12251,14 +11595,14 @@
                                 </p:cTn>
                               </p:par>
                               <p:par>
-                                <p:cTn id="100" presetID="1" presetClass="entr" presetSubtype="0" fill="hold" grpId="1" nodeType="withEffect">
+                                <p:cTn id="64" presetID="1" presetClass="entr" presetSubtype="0" fill="hold" grpId="1" nodeType="withEffect">
                                   <p:stCondLst>
                                     <p:cond delay="0"/>
                                   </p:stCondLst>
                                   <p:childTnLst>
                                     <p:set>
                                       <p:cBhvr>
-                                        <p:cTn id="101" dur="1" fill="hold">
+                                        <p:cTn id="65" dur="1" fill="hold">
                                           <p:stCondLst>
                                             <p:cond delay="0"/>
                                           </p:stCondLst>
@@ -12278,14 +11622,14 @@
                                 </p:cTn>
                               </p:par>
                               <p:par>
-                                <p:cTn id="102" presetID="1" presetClass="entr" presetSubtype="0" fill="hold" nodeType="withEffect">
+                                <p:cTn id="66" presetID="1" presetClass="entr" presetSubtype="0" fill="hold" nodeType="withEffect">
                                   <p:stCondLst>
                                     <p:cond delay="0"/>
                                   </p:stCondLst>
                                   <p:childTnLst>
                                     <p:set>
                                       <p:cBhvr>
-                                        <p:cTn id="103" dur="1" fill="hold">
+                                        <p:cTn id="67" dur="1" fill="hold">
                                           <p:stCondLst>
                                             <p:cond delay="0"/>
                                           </p:stCondLst>
@@ -12305,14 +11649,14 @@
                                 </p:cTn>
                               </p:par>
                               <p:par>
-                                <p:cTn id="104" presetID="1" presetClass="entr" presetSubtype="0" fill="hold" grpId="1" nodeType="withEffect">
+                                <p:cTn id="68" presetID="1" presetClass="entr" presetSubtype="0" fill="hold" grpId="1" nodeType="withEffect">
                                   <p:stCondLst>
                                     <p:cond delay="0"/>
                                   </p:stCondLst>
                                   <p:childTnLst>
                                     <p:set>
                                       <p:cBhvr>
-                                        <p:cTn id="105" dur="1" fill="hold">
+                                        <p:cTn id="69" dur="1" fill="hold">
                                           <p:stCondLst>
                                             <p:cond delay="0"/>
                                           </p:stCondLst>
@@ -12379,7 +11723,7 @@
 </file>
 
 <file path=ppt/slides/slide5.xml><?xml version="1.0" encoding="utf-8"?>
-<p:sld xmlns:a="http://schemas.openxmlformats.org/drawingml/2006/main" xmlns:r="http://schemas.openxmlformats.org/officeDocument/2006/relationships" xmlns:mc="http://schemas.openxmlformats.org/markup-compatibility/2006" xmlns:mv="urn:schemas-microsoft-com:mac:vml" xmlns:p="http://schemas.openxmlformats.org/presentationml/2006/main" mc:Ignorable="mv" mc:PreserveAttributes="mv:*">
+<p:sld xmlns:a="http://schemas.openxmlformats.org/drawingml/2006/main" xmlns:r="http://schemas.openxmlformats.org/officeDocument/2006/relationships" xmlns:p="http://schemas.openxmlformats.org/presentationml/2006/main">
   <p:cSld>
     <p:spTree>
       <p:nvGrpSpPr>
@@ -12568,7 +11912,7 @@
 </file>
 
 <file path=ppt/slides/slide6.xml><?xml version="1.0" encoding="utf-8"?>
-<p:sld xmlns:a="http://schemas.openxmlformats.org/drawingml/2006/main" xmlns:r="http://schemas.openxmlformats.org/officeDocument/2006/relationships" xmlns:mc="http://schemas.openxmlformats.org/markup-compatibility/2006" xmlns:mv="urn:schemas-microsoft-com:mac:vml" xmlns:p="http://schemas.openxmlformats.org/presentationml/2006/main" mc:Ignorable="mv" mc:PreserveAttributes="mv:*">
+<p:sld xmlns:a="http://schemas.openxmlformats.org/drawingml/2006/main" xmlns:r="http://schemas.openxmlformats.org/officeDocument/2006/relationships" xmlns:p="http://schemas.openxmlformats.org/presentationml/2006/main">
   <p:cSld>
     <p:spTree>
       <p:nvGrpSpPr>
@@ -12711,7 +12055,7 @@
 </file>
 
 <file path=ppt/slides/slide7.xml><?xml version="1.0" encoding="utf-8"?>
-<p:sld xmlns:a="http://schemas.openxmlformats.org/drawingml/2006/main" xmlns:r="http://schemas.openxmlformats.org/officeDocument/2006/relationships" xmlns:mc="http://schemas.openxmlformats.org/markup-compatibility/2006" xmlns:mv="urn:schemas-microsoft-com:mac:vml" xmlns:p="http://schemas.openxmlformats.org/presentationml/2006/main" mc:Ignorable="mv" mc:PreserveAttributes="mv:*">
+<p:sld xmlns:a="http://schemas.openxmlformats.org/drawingml/2006/main" xmlns:r="http://schemas.openxmlformats.org/officeDocument/2006/relationships" xmlns:p="http://schemas.openxmlformats.org/presentationml/2006/main">
   <p:cSld>
     <p:spTree>
       <p:nvGrpSpPr>
@@ -12854,7 +12198,7 @@
 </file>
 
 <file path=ppt/slides/slide8.xml><?xml version="1.0" encoding="utf-8"?>
-<p:sld xmlns:a="http://schemas.openxmlformats.org/drawingml/2006/main" xmlns:r="http://schemas.openxmlformats.org/officeDocument/2006/relationships" xmlns:mc="http://schemas.openxmlformats.org/markup-compatibility/2006" xmlns:mv="urn:schemas-microsoft-com:mac:vml" xmlns:p="http://schemas.openxmlformats.org/presentationml/2006/main" mc:Ignorable="mv" mc:PreserveAttributes="mv:*">
+<p:sld xmlns:a="http://schemas.openxmlformats.org/drawingml/2006/main" xmlns:r="http://schemas.openxmlformats.org/officeDocument/2006/relationships" xmlns:p="http://schemas.openxmlformats.org/presentationml/2006/main">
   <p:cSld>
     <p:spTree>
       <p:nvGrpSpPr>
@@ -12996,7 +12340,7 @@
 </file>
 
 <file path=ppt/slides/slide9.xml><?xml version="1.0" encoding="utf-8"?>
-<p:sld xmlns:a="http://schemas.openxmlformats.org/drawingml/2006/main" xmlns:r="http://schemas.openxmlformats.org/officeDocument/2006/relationships" xmlns:mc="http://schemas.openxmlformats.org/markup-compatibility/2006" xmlns:mv="urn:schemas-microsoft-com:mac:vml" xmlns:p="http://schemas.openxmlformats.org/presentationml/2006/main" mc:Ignorable="mv" mc:PreserveAttributes="mv:*">
+<p:sld xmlns:a="http://schemas.openxmlformats.org/drawingml/2006/main" xmlns:r="http://schemas.openxmlformats.org/officeDocument/2006/relationships" xmlns:p="http://schemas.openxmlformats.org/presentationml/2006/main">
   <p:cSld>
     <p:spTree>
       <p:nvGrpSpPr>
@@ -13492,7 +12836,7 @@
   <a:extraClrSchemeLst/>
   <a:extLst>
     <a:ext uri="{05A4C25C-085E-4340-85A3-A5531E510DB2}">
-      <thm15:themeFamily xmlns="" xmlns:a="http://schemas.openxmlformats.org/drawingml/2006/main" xmlns:thm15="http://schemas.microsoft.com/office/thememl/2012/main" name="Facet" id="{C0C680CD-088A-49FC-A102-D699147F32B2}" vid="{CFBC31BA-B70F-4F30-BCAA-4F3011E16C4D}"/>
+      <thm15:themeFamily xmlns:thm15="http://schemas.microsoft.com/office/thememl/2012/main" name="Facet" id="{C0C680CD-088A-49FC-A102-D699147F32B2}" vid="{CFBC31BA-B70F-4F30-BCAA-4F3011E16C4D}"/>
     </a:ext>
   </a:extLst>
 </a:theme>

</xml_diff>